<commit_message>
update after 1st round teaching
</commit_message>
<xml_diff>
--- a/Py Web Unit0.pptx
+++ b/Py Web Unit0.pptx
@@ -134,12 +134,12 @@
   <pc:docChgLst>
     <pc:chgData name="Li Lixiang" userId="6104bbfcb56aea79" providerId="LiveId" clId="{73E4B0B5-5950-4F20-8031-729779FF7831}"/>
     <pc:docChg chg="undo redo custSel addSld modSld addMainMaster delMainMaster">
-      <pc:chgData name="Li Lixiang" userId="6104bbfcb56aea79" providerId="LiveId" clId="{73E4B0B5-5950-4F20-8031-729779FF7831}" dt="2021-08-29T02:05:59.080" v="4058" actId="14100"/>
+      <pc:chgData name="Li Lixiang" userId="6104bbfcb56aea79" providerId="LiveId" clId="{73E4B0B5-5950-4F20-8031-729779FF7831}" dt="2021-10-11T12:48:58.773" v="4075" actId="20577"/>
       <pc:docMkLst>
         <pc:docMk/>
       </pc:docMkLst>
       <pc:sldChg chg="addSp delSp modSp new mod setBg modClrScheme setClrOvrMap delDesignElem chgLayout">
-        <pc:chgData name="Li Lixiang" userId="6104bbfcb56aea79" providerId="LiveId" clId="{73E4B0B5-5950-4F20-8031-729779FF7831}" dt="2021-08-28T02:47:43.969" v="54" actId="26606"/>
+        <pc:chgData name="Li Lixiang" userId="6104bbfcb56aea79" providerId="LiveId" clId="{73E4B0B5-5950-4F20-8031-729779FF7831}" dt="2021-10-11T12:48:58.773" v="4075" actId="20577"/>
         <pc:sldMkLst>
           <pc:docMk/>
           <pc:sldMk cId="993770899" sldId="256"/>
@@ -153,7 +153,7 @@
           </ac:spMkLst>
         </pc:spChg>
         <pc:spChg chg="mod">
-          <ac:chgData name="Li Lixiang" userId="6104bbfcb56aea79" providerId="LiveId" clId="{73E4B0B5-5950-4F20-8031-729779FF7831}" dt="2021-08-28T02:47:43.969" v="54" actId="26606"/>
+          <ac:chgData name="Li Lixiang" userId="6104bbfcb56aea79" providerId="LiveId" clId="{73E4B0B5-5950-4F20-8031-729779FF7831}" dt="2021-10-11T12:48:58.773" v="4075" actId="20577"/>
           <ac:spMkLst>
             <pc:docMk/>
             <pc:sldMk cId="993770899" sldId="256"/>
@@ -507,7 +507,7 @@
         </pc:picChg>
       </pc:sldChg>
       <pc:sldChg chg="delSp modSp add mod">
-        <pc:chgData name="Li Lixiang" userId="6104bbfcb56aea79" providerId="LiveId" clId="{73E4B0B5-5950-4F20-8031-729779FF7831}" dt="2021-08-28T09:55:59.696" v="3751" actId="113"/>
+        <pc:chgData name="Li Lixiang" userId="6104bbfcb56aea79" providerId="LiveId" clId="{73E4B0B5-5950-4F20-8031-729779FF7831}" dt="2021-09-30T11:50:24.535" v="4069" actId="20577"/>
         <pc:sldMkLst>
           <pc:docMk/>
           <pc:sldMk cId="199264404" sldId="264"/>
@@ -521,7 +521,7 @@
           </ac:spMkLst>
         </pc:spChg>
         <pc:spChg chg="mod">
-          <ac:chgData name="Li Lixiang" userId="6104bbfcb56aea79" providerId="LiveId" clId="{73E4B0B5-5950-4F20-8031-729779FF7831}" dt="2021-08-28T09:55:40.066" v="3749" actId="1076"/>
+          <ac:chgData name="Li Lixiang" userId="6104bbfcb56aea79" providerId="LiveId" clId="{73E4B0B5-5950-4F20-8031-729779FF7831}" dt="2021-09-30T11:50:24.535" v="4069" actId="20577"/>
           <ac:spMkLst>
             <pc:docMk/>
             <pc:sldMk cId="199264404" sldId="264"/>
@@ -1328,7 +1328,7 @@
             <a:fld id="{A5B0A250-5CC0-1746-B209-08E8B0DAE6AF}" type="datetimeFigureOut">
               <a:rPr lang="en-US" smtClean="0"/>
               <a:pPr algn="l"/>
-              <a:t>8/29/2021</a:t>
+              <a:t>10/11/2021</a:t>
             </a:fld>
             <a:endParaRPr lang="en-US" dirty="0"/>
           </a:p>
@@ -1507,7 +1507,7 @@
           <a:p>
             <a:fld id="{A5B0A250-5CC0-1746-B209-08E8B0DAE6AF}" type="datetimeFigureOut">
               <a:rPr lang="en-US" smtClean="0"/>
-              <a:t>8/29/2021</a:t>
+              <a:t>10/11/2021</a:t>
             </a:fld>
             <a:endParaRPr lang="en-US" dirty="0"/>
           </a:p>
@@ -1687,7 +1687,7 @@
           <a:p>
             <a:fld id="{A5B0A250-5CC0-1746-B209-08E8B0DAE6AF}" type="datetimeFigureOut">
               <a:rPr lang="en-US" smtClean="0"/>
-              <a:t>8/29/2021</a:t>
+              <a:t>10/11/2021</a:t>
             </a:fld>
             <a:endParaRPr lang="en-US"/>
           </a:p>
@@ -1857,7 +1857,7 @@
           <a:p>
             <a:fld id="{A5B0A250-5CC0-1746-B209-08E8B0DAE6AF}" type="datetimeFigureOut">
               <a:rPr lang="en-US" smtClean="0"/>
-              <a:t>8/29/2021</a:t>
+              <a:t>10/11/2021</a:t>
             </a:fld>
             <a:endParaRPr lang="en-US" dirty="0"/>
           </a:p>
@@ -2170,7 +2170,7 @@
           <a:p>
             <a:fld id="{A5B0A250-5CC0-1746-B209-08E8B0DAE6AF}" type="datetimeFigureOut">
               <a:rPr lang="en-US" smtClean="0"/>
-              <a:t>8/29/2021</a:t>
+              <a:t>10/11/2021</a:t>
             </a:fld>
             <a:endParaRPr lang="en-US" dirty="0"/>
           </a:p>
@@ -2556,7 +2556,7 @@
           <a:p>
             <a:fld id="{A5B0A250-5CC0-1746-B209-08E8B0DAE6AF}" type="datetimeFigureOut">
               <a:rPr lang="en-US" smtClean="0"/>
-              <a:t>8/29/2021</a:t>
+              <a:t>10/11/2021</a:t>
             </a:fld>
             <a:endParaRPr lang="en-US" dirty="0"/>
           </a:p>
@@ -2990,7 +2990,7 @@
           <a:p>
             <a:fld id="{A5B0A250-5CC0-1746-B209-08E8B0DAE6AF}" type="datetimeFigureOut">
               <a:rPr lang="en-US" smtClean="0"/>
-              <a:t>8/29/2021</a:t>
+              <a:t>10/11/2021</a:t>
             </a:fld>
             <a:endParaRPr lang="en-US" dirty="0"/>
           </a:p>
@@ -3108,7 +3108,7 @@
           <a:p>
             <a:fld id="{A5B0A250-5CC0-1746-B209-08E8B0DAE6AF}" type="datetimeFigureOut">
               <a:rPr lang="en-US" smtClean="0"/>
-              <a:t>8/29/2021</a:t>
+              <a:t>10/11/2021</a:t>
             </a:fld>
             <a:endParaRPr lang="en-US" dirty="0"/>
           </a:p>
@@ -3204,7 +3204,7 @@
             <a:fld id="{A5B0A250-5CC0-1746-B209-08E8B0DAE6AF}" type="datetimeFigureOut">
               <a:rPr lang="en-US" smtClean="0"/>
               <a:pPr/>
-              <a:t>8/29/2021</a:t>
+              <a:t>10/11/2021</a:t>
             </a:fld>
             <a:endParaRPr lang="en-US" dirty="0"/>
           </a:p>
@@ -3555,7 +3555,7 @@
           <a:p>
             <a:fld id="{A5B0A250-5CC0-1746-B209-08E8B0DAE6AF}" type="datetimeFigureOut">
               <a:rPr lang="en-US" smtClean="0"/>
-              <a:t>8/29/2021</a:t>
+              <a:t>10/11/2021</a:t>
             </a:fld>
             <a:endParaRPr lang="en-US" dirty="0"/>
           </a:p>
@@ -3980,7 +3980,7 @@
           <a:p>
             <a:fld id="{A5B0A250-5CC0-1746-B209-08E8B0DAE6AF}" type="datetimeFigureOut">
               <a:rPr lang="en-US" smtClean="0"/>
-              <a:t>8/29/2021</a:t>
+              <a:t>10/11/2021</a:t>
             </a:fld>
             <a:endParaRPr lang="en-US" dirty="0"/>
           </a:p>
@@ -4262,7 +4262,7 @@
             <a:fld id="{A5B0A250-5CC0-1746-B209-08E8B0DAE6AF}" type="datetimeFigureOut">
               <a:rPr lang="en-US" smtClean="0"/>
               <a:pPr/>
-              <a:t>8/29/2021</a:t>
+              <a:t>10/11/2021</a:t>
             </a:fld>
             <a:endParaRPr lang="en-US" dirty="0"/>
           </a:p>
@@ -4973,7 +4973,7 @@
           <a:p>
             <a:r>
               <a:rPr lang="en-US" dirty="0"/>
-              <a:t>HTML and CSS</a:t>
+              <a:t>HTTP, HTML and CSS</a:t>
             </a:r>
             <a:endParaRPr lang="en-MY" dirty="0"/>
           </a:p>
@@ -6423,7 +6423,7 @@
                 <a:effectLst/>
                 <a:latin typeface="Rockwell (Body)"/>
               </a:rPr>
-              <a:t> -Multiple Choice</a:t>
+              <a:t> – Multiple Choice</a:t>
             </a:r>
           </a:p>
           <a:p>
@@ -6439,7 +6439,7 @@
                 <a:effectLst/>
                 <a:latin typeface="Rockwell (Body)"/>
               </a:rPr>
-              <a:t>4xx</a:t>
+              <a:t>4xx </a:t>
             </a:r>
             <a:r>
               <a:rPr lang="en-MY" b="0" i="0" dirty="0">
@@ -6475,7 +6475,7 @@
                 <a:effectLst/>
                 <a:latin typeface="Rockwell (Body)"/>
               </a:rPr>
-              <a:t> -Server Error</a:t>
+              <a:t> – Server Error</a:t>
             </a:r>
           </a:p>
           <a:p>

</xml_diff>

<commit_message>
update after 2nd teaching
</commit_message>
<xml_diff>
--- a/Py Web Unit0.pptx
+++ b/Py Web Unit0.pptx
@@ -8,13 +8,15 @@
     <p:sldId id="256" r:id="rId2"/>
     <p:sldId id="257" r:id="rId3"/>
     <p:sldId id="263" r:id="rId4"/>
-    <p:sldId id="262" r:id="rId5"/>
-    <p:sldId id="264" r:id="rId6"/>
-    <p:sldId id="265" r:id="rId7"/>
-    <p:sldId id="261" r:id="rId8"/>
-    <p:sldId id="259" r:id="rId9"/>
-    <p:sldId id="260" r:id="rId10"/>
-    <p:sldId id="258" r:id="rId11"/>
+    <p:sldId id="266" r:id="rId5"/>
+    <p:sldId id="267" r:id="rId6"/>
+    <p:sldId id="262" r:id="rId7"/>
+    <p:sldId id="264" r:id="rId8"/>
+    <p:sldId id="265" r:id="rId9"/>
+    <p:sldId id="261" r:id="rId10"/>
+    <p:sldId id="259" r:id="rId11"/>
+    <p:sldId id="260" r:id="rId12"/>
+    <p:sldId id="258" r:id="rId13"/>
   </p:sldIdLst>
   <p:sldSz cx="12192000" cy="6858000"/>
   <p:notesSz cx="6858000" cy="9144000"/>
@@ -124,7 +126,7 @@
 <file path=ppt/revisionInfo.xml><?xml version="1.0" encoding="utf-8"?>
 <p1510:revInfo xmlns:a="http://schemas.openxmlformats.org/drawingml/2006/main" xmlns:r="http://schemas.openxmlformats.org/officeDocument/2006/relationships" xmlns:p1510="http://schemas.microsoft.com/office/powerpoint/2015/10/main">
   <p1510:revLst>
-    <p1510:client id="{73E4B0B5-5950-4F20-8031-729779FF7831}" v="102" dt="2021-08-28T10:12:02.245"/>
+    <p1510:client id="{73E4B0B5-5950-4F20-8031-729779FF7831}" v="126" dt="2021-12-18T02:54:43.990"/>
   </p1510:revLst>
 </p1510:revInfo>
 </file>
@@ -133,8 +135,8 @@
 <pc:chgInfo xmlns:a="http://schemas.openxmlformats.org/drawingml/2006/main" xmlns:r="http://schemas.openxmlformats.org/officeDocument/2006/relationships" xmlns:ac="http://schemas.microsoft.com/office/drawing/2013/main/command" xmlns:pc="http://schemas.microsoft.com/office/powerpoint/2013/main/command">
   <pc:docChgLst>
     <pc:chgData name="Li Lixiang" userId="6104bbfcb56aea79" providerId="LiveId" clId="{73E4B0B5-5950-4F20-8031-729779FF7831}"/>
-    <pc:docChg chg="undo redo custSel addSld modSld addMainMaster delMainMaster">
-      <pc:chgData name="Li Lixiang" userId="6104bbfcb56aea79" providerId="LiveId" clId="{73E4B0B5-5950-4F20-8031-729779FF7831}" dt="2021-10-11T12:48:58.773" v="4075" actId="20577"/>
+    <pc:docChg chg="undo redo custSel addSld modSld sldOrd addMainMaster delMainMaster">
+      <pc:chgData name="Li Lixiang" userId="6104bbfcb56aea79" providerId="LiveId" clId="{73E4B0B5-5950-4F20-8031-729779FF7831}" dt="2021-12-18T02:56:43.054" v="5143" actId="20577"/>
       <pc:docMkLst>
         <pc:docMk/>
       </pc:docMkLst>
@@ -397,13 +399,13 @@
         </pc:spChg>
       </pc:sldChg>
       <pc:sldChg chg="addSp delSp modSp add mod">
-        <pc:chgData name="Li Lixiang" userId="6104bbfcb56aea79" providerId="LiveId" clId="{73E4B0B5-5950-4F20-8031-729779FF7831}" dt="2021-08-28T09:53:39.636" v="3660" actId="27636"/>
+        <pc:chgData name="Li Lixiang" userId="6104bbfcb56aea79" providerId="LiveId" clId="{73E4B0B5-5950-4F20-8031-729779FF7831}" dt="2021-12-18T02:50:35.792" v="4783" actId="14100"/>
         <pc:sldMkLst>
           <pc:docMk/>
           <pc:sldMk cId="2821288432" sldId="262"/>
         </pc:sldMkLst>
         <pc:spChg chg="mod">
-          <ac:chgData name="Li Lixiang" userId="6104bbfcb56aea79" providerId="LiveId" clId="{73E4B0B5-5950-4F20-8031-729779FF7831}" dt="2021-08-28T09:53:30.278" v="3657" actId="20577"/>
+          <ac:chgData name="Li Lixiang" userId="6104bbfcb56aea79" providerId="LiveId" clId="{73E4B0B5-5950-4F20-8031-729779FF7831}" dt="2021-12-18T02:47:04.575" v="4622" actId="6549"/>
           <ac:spMkLst>
             <pc:docMk/>
             <pc:sldMk cId="2821288432" sldId="262"/>
@@ -411,7 +413,7 @@
           </ac:spMkLst>
         </pc:spChg>
         <pc:spChg chg="mod">
-          <ac:chgData name="Li Lixiang" userId="6104bbfcb56aea79" providerId="LiveId" clId="{73E4B0B5-5950-4F20-8031-729779FF7831}" dt="2021-08-28T09:53:39.636" v="3660" actId="27636"/>
+          <ac:chgData name="Li Lixiang" userId="6104bbfcb56aea79" providerId="LiveId" clId="{73E4B0B5-5950-4F20-8031-729779FF7831}" dt="2021-12-18T02:50:35.792" v="4783" actId="14100"/>
           <ac:spMkLst>
             <pc:docMk/>
             <pc:sldMk cId="2821288432" sldId="262"/>
@@ -426,6 +428,22 @@
             <ac:spMk id="8" creationId="{C73554D7-AC09-4452-95C4-E7476A019960}"/>
           </ac:spMkLst>
         </pc:spChg>
+        <pc:picChg chg="add del mod">
+          <ac:chgData name="Li Lixiang" userId="6104bbfcb56aea79" providerId="LiveId" clId="{73E4B0B5-5950-4F20-8031-729779FF7831}" dt="2021-12-18T02:47:06.605" v="4623" actId="478"/>
+          <ac:picMkLst>
+            <pc:docMk/>
+            <pc:sldMk cId="2821288432" sldId="262"/>
+            <ac:picMk id="5" creationId="{88E84014-9E0B-432D-AAAC-4C1EC77C4D45}"/>
+          </ac:picMkLst>
+        </pc:picChg>
+        <pc:picChg chg="add mod">
+          <ac:chgData name="Li Lixiang" userId="6104bbfcb56aea79" providerId="LiveId" clId="{73E4B0B5-5950-4F20-8031-729779FF7831}" dt="2021-12-18T02:48:51.430" v="4715" actId="14100"/>
+          <ac:picMkLst>
+            <pc:docMk/>
+            <pc:sldMk cId="2821288432" sldId="262"/>
+            <ac:picMk id="7" creationId="{DD254C58-9393-4AFA-80F9-BC5240462750}"/>
+          </ac:picMkLst>
+        </pc:picChg>
         <pc:picChg chg="del">
           <ac:chgData name="Li Lixiang" userId="6104bbfcb56aea79" providerId="LiveId" clId="{73E4B0B5-5950-4F20-8031-729779FF7831}" dt="2021-08-28T09:33:26.553" v="3422" actId="478"/>
           <ac:picMkLst>
@@ -442,8 +460,8 @@
             <ac:picMk id="1028" creationId="{6AFA4D2C-AAFC-476F-9CF1-A5CA28BE3C6E}"/>
           </ac:picMkLst>
         </pc:picChg>
-        <pc:picChg chg="mod">
-          <ac:chgData name="Li Lixiang" userId="6104bbfcb56aea79" providerId="LiveId" clId="{73E4B0B5-5950-4F20-8031-729779FF7831}" dt="2021-08-28T09:39:20.707" v="3444" actId="1076"/>
+        <pc:picChg chg="del mod">
+          <ac:chgData name="Li Lixiang" userId="6104bbfcb56aea79" providerId="LiveId" clId="{73E4B0B5-5950-4F20-8031-729779FF7831}" dt="2021-12-18T02:46:07.756" v="4611" actId="478"/>
           <ac:picMkLst>
             <pc:docMk/>
             <pc:sldMk cId="2821288432" sldId="262"/>
@@ -452,7 +470,7 @@
         </pc:picChg>
       </pc:sldChg>
       <pc:sldChg chg="addSp delSp modSp add mod">
-        <pc:chgData name="Li Lixiang" userId="6104bbfcb56aea79" providerId="LiveId" clId="{73E4B0B5-5950-4F20-8031-729779FF7831}" dt="2021-08-28T09:46:14.077" v="3622" actId="14100"/>
+        <pc:chgData name="Li Lixiang" userId="6104bbfcb56aea79" providerId="LiveId" clId="{73E4B0B5-5950-4F20-8031-729779FF7831}" dt="2021-12-18T02:34:11.612" v="4311" actId="20578"/>
         <pc:sldMkLst>
           <pc:docMk/>
           <pc:sldMk cId="3795919391" sldId="263"/>
@@ -466,7 +484,7 @@
           </ac:spMkLst>
         </pc:spChg>
         <pc:spChg chg="mod">
-          <ac:chgData name="Li Lixiang" userId="6104bbfcb56aea79" providerId="LiveId" clId="{73E4B0B5-5950-4F20-8031-729779FF7831}" dt="2021-08-28T09:46:14.077" v="3622" actId="14100"/>
+          <ac:chgData name="Li Lixiang" userId="6104bbfcb56aea79" providerId="LiveId" clId="{73E4B0B5-5950-4F20-8031-729779FF7831}" dt="2021-12-18T02:34:11.612" v="4311" actId="20578"/>
           <ac:spMkLst>
             <pc:docMk/>
             <pc:sldMk cId="3795919391" sldId="263"/>
@@ -506,8 +524,8 @@
           </ac:picMkLst>
         </pc:picChg>
       </pc:sldChg>
-      <pc:sldChg chg="delSp modSp add mod">
-        <pc:chgData name="Li Lixiang" userId="6104bbfcb56aea79" providerId="LiveId" clId="{73E4B0B5-5950-4F20-8031-729779FF7831}" dt="2021-09-30T11:50:24.535" v="4069" actId="20577"/>
+      <pc:sldChg chg="addSp delSp modSp add mod">
+        <pc:chgData name="Li Lixiang" userId="6104bbfcb56aea79" providerId="LiveId" clId="{73E4B0B5-5950-4F20-8031-729779FF7831}" dt="2021-12-18T02:54:51.889" v="4957" actId="14100"/>
         <pc:sldMkLst>
           <pc:docMk/>
           <pc:sldMk cId="199264404" sldId="264"/>
@@ -528,12 +546,44 @@
             <ac:spMk id="3" creationId="{588B000C-CCD7-42E0-A4A2-DB893ED55A0D}"/>
           </ac:spMkLst>
         </pc:spChg>
+        <pc:spChg chg="add mod">
+          <ac:chgData name="Li Lixiang" userId="6104bbfcb56aea79" providerId="LiveId" clId="{73E4B0B5-5950-4F20-8031-729779FF7831}" dt="2021-12-18T02:54:04.077" v="4947" actId="1076"/>
+          <ac:spMkLst>
+            <pc:docMk/>
+            <pc:sldMk cId="199264404" sldId="264"/>
+            <ac:spMk id="4" creationId="{B3895BAD-CA64-49A7-949A-63ED6B21B369}"/>
+          </ac:spMkLst>
+        </pc:spChg>
+        <pc:spChg chg="add mod">
+          <ac:chgData name="Li Lixiang" userId="6104bbfcb56aea79" providerId="LiveId" clId="{73E4B0B5-5950-4F20-8031-729779FF7831}" dt="2021-12-18T02:54:04.077" v="4947" actId="1076"/>
+          <ac:spMkLst>
+            <pc:docMk/>
+            <pc:sldMk cId="199264404" sldId="264"/>
+            <ac:spMk id="6" creationId="{EF5F972B-EEB3-4F06-B9D2-444315D78822}"/>
+          </ac:spMkLst>
+        </pc:spChg>
+        <pc:spChg chg="add mod">
+          <ac:chgData name="Li Lixiang" userId="6104bbfcb56aea79" providerId="LiveId" clId="{73E4B0B5-5950-4F20-8031-729779FF7831}" dt="2021-12-18T02:54:04.077" v="4947" actId="1076"/>
+          <ac:spMkLst>
+            <pc:docMk/>
+            <pc:sldMk cId="199264404" sldId="264"/>
+            <ac:spMk id="7" creationId="{F020CEB7-BBD8-42D5-83E1-7517F5B9A568}"/>
+          </ac:spMkLst>
+        </pc:spChg>
         <pc:spChg chg="mod">
           <ac:chgData name="Li Lixiang" userId="6104bbfcb56aea79" providerId="LiveId" clId="{73E4B0B5-5950-4F20-8031-729779FF7831}" dt="2021-08-28T09:55:59.696" v="3751" actId="113"/>
           <ac:spMkLst>
             <pc:docMk/>
             <pc:sldMk cId="199264404" sldId="264"/>
             <ac:spMk id="8" creationId="{C73554D7-AC09-4452-95C4-E7476A019960}"/>
+          </ac:spMkLst>
+        </pc:spChg>
+        <pc:spChg chg="add mod">
+          <ac:chgData name="Li Lixiang" userId="6104bbfcb56aea79" providerId="LiveId" clId="{73E4B0B5-5950-4F20-8031-729779FF7831}" dt="2021-12-18T02:54:04.077" v="4947" actId="1076"/>
+          <ac:spMkLst>
+            <pc:docMk/>
+            <pc:sldMk cId="199264404" sldId="264"/>
+            <ac:spMk id="9" creationId="{A272354E-BFCB-4B68-976C-368AB85D5CAC}"/>
           </ac:spMkLst>
         </pc:spChg>
         <pc:picChg chg="del">
@@ -544,9 +594,41 @@
             <ac:picMk id="1030" creationId="{5FBD96A7-0060-4A0F-9A25-8E1008BB9C90}"/>
           </ac:picMkLst>
         </pc:picChg>
+        <pc:cxnChg chg="add">
+          <ac:chgData name="Li Lixiang" userId="6104bbfcb56aea79" providerId="LiveId" clId="{73E4B0B5-5950-4F20-8031-729779FF7831}" dt="2021-12-18T02:54:18.640" v="4948" actId="11529"/>
+          <ac:cxnSpMkLst>
+            <pc:docMk/>
+            <pc:sldMk cId="199264404" sldId="264"/>
+            <ac:cxnSpMk id="10" creationId="{D586C27A-D9D5-4B1D-8788-A1C78DA2C638}"/>
+          </ac:cxnSpMkLst>
+        </pc:cxnChg>
+        <pc:cxnChg chg="add mod">
+          <ac:chgData name="Li Lixiang" userId="6104bbfcb56aea79" providerId="LiveId" clId="{73E4B0B5-5950-4F20-8031-729779FF7831}" dt="2021-12-18T02:54:31.983" v="4951" actId="14100"/>
+          <ac:cxnSpMkLst>
+            <pc:docMk/>
+            <pc:sldMk cId="199264404" sldId="264"/>
+            <ac:cxnSpMk id="11" creationId="{3B62EA24-8541-4E26-85E4-7C269C660B7A}"/>
+          </ac:cxnSpMkLst>
+        </pc:cxnChg>
+        <pc:cxnChg chg="add mod">
+          <ac:chgData name="Li Lixiang" userId="6104bbfcb56aea79" providerId="LiveId" clId="{73E4B0B5-5950-4F20-8031-729779FF7831}" dt="2021-12-18T02:54:42.592" v="4954" actId="14100"/>
+          <ac:cxnSpMkLst>
+            <pc:docMk/>
+            <pc:sldMk cId="199264404" sldId="264"/>
+            <ac:cxnSpMk id="13" creationId="{A82AE415-D90B-41F1-B248-B072EB5B2118}"/>
+          </ac:cxnSpMkLst>
+        </pc:cxnChg>
+        <pc:cxnChg chg="add mod">
+          <ac:chgData name="Li Lixiang" userId="6104bbfcb56aea79" providerId="LiveId" clId="{73E4B0B5-5950-4F20-8031-729779FF7831}" dt="2021-12-18T02:54:51.889" v="4957" actId="14100"/>
+          <ac:cxnSpMkLst>
+            <pc:docMk/>
+            <pc:sldMk cId="199264404" sldId="264"/>
+            <ac:cxnSpMk id="16" creationId="{E4D072DE-159E-4BA7-9627-7338C483E92B}"/>
+          </ac:cxnSpMkLst>
+        </pc:cxnChg>
       </pc:sldChg>
       <pc:sldChg chg="addSp delSp modSp add mod">
-        <pc:chgData name="Li Lixiang" userId="6104bbfcb56aea79" providerId="LiveId" clId="{73E4B0B5-5950-4F20-8031-729779FF7831}" dt="2021-08-29T02:05:41.231" v="4057" actId="20577"/>
+        <pc:chgData name="Li Lixiang" userId="6104bbfcb56aea79" providerId="LiveId" clId="{73E4B0B5-5950-4F20-8031-729779FF7831}" dt="2021-12-18T02:56:43.054" v="5143" actId="20577"/>
         <pc:sldMkLst>
           <pc:docMk/>
           <pc:sldMk cId="2165206761" sldId="265"/>
@@ -664,7 +746,7 @@
           </ac:spMkLst>
         </pc:spChg>
         <pc:spChg chg="add mod">
-          <ac:chgData name="Li Lixiang" userId="6104bbfcb56aea79" providerId="LiveId" clId="{73E4B0B5-5950-4F20-8031-729779FF7831}" dt="2021-08-29T02:05:41.231" v="4057" actId="20577"/>
+          <ac:chgData name="Li Lixiang" userId="6104bbfcb56aea79" providerId="LiveId" clId="{73E4B0B5-5950-4F20-8031-729779FF7831}" dt="2021-12-18T02:56:43.054" v="5143" actId="20577"/>
           <ac:spMkLst>
             <pc:docMk/>
             <pc:sldMk cId="2165206761" sldId="265"/>
@@ -679,6 +761,84 @@
             <ac:cxnSpMk id="17" creationId="{7C3F818A-DBDC-41AF-AAA4-60F9618AAC40}"/>
           </ac:cxnSpMkLst>
         </pc:cxnChg>
+      </pc:sldChg>
+      <pc:sldChg chg="addSp delSp modSp new mod ord">
+        <pc:chgData name="Li Lixiang" userId="6104bbfcb56aea79" providerId="LiveId" clId="{73E4B0B5-5950-4F20-8031-729779FF7831}" dt="2021-12-18T02:39:38.943" v="4607" actId="1076"/>
+        <pc:sldMkLst>
+          <pc:docMk/>
+          <pc:sldMk cId="2292814740" sldId="266"/>
+        </pc:sldMkLst>
+        <pc:spChg chg="mod">
+          <ac:chgData name="Li Lixiang" userId="6104bbfcb56aea79" providerId="LiveId" clId="{73E4B0B5-5950-4F20-8031-729779FF7831}" dt="2021-12-18T02:37:17.872" v="4331" actId="20577"/>
+          <ac:spMkLst>
+            <pc:docMk/>
+            <pc:sldMk cId="2292814740" sldId="266"/>
+            <ac:spMk id="2" creationId="{869DD70D-D398-49E8-AE58-30C33CCF17D9}"/>
+          </ac:spMkLst>
+        </pc:spChg>
+        <pc:spChg chg="mod">
+          <ac:chgData name="Li Lixiang" userId="6104bbfcb56aea79" providerId="LiveId" clId="{73E4B0B5-5950-4F20-8031-729779FF7831}" dt="2021-12-18T02:39:27.239" v="4606" actId="14100"/>
+          <ac:spMkLst>
+            <pc:docMk/>
+            <pc:sldMk cId="2292814740" sldId="266"/>
+            <ac:spMk id="3" creationId="{11900CA0-561C-4846-A795-A67DA9694DD0}"/>
+          </ac:spMkLst>
+        </pc:spChg>
+        <pc:spChg chg="add mod">
+          <ac:chgData name="Li Lixiang" userId="6104bbfcb56aea79" providerId="LiveId" clId="{73E4B0B5-5950-4F20-8031-729779FF7831}" dt="2021-12-18T02:39:38.943" v="4607" actId="1076"/>
+          <ac:spMkLst>
+            <pc:docMk/>
+            <pc:sldMk cId="2292814740" sldId="266"/>
+            <ac:spMk id="4" creationId="{884911C1-D7E4-4EBC-9EA0-58C00D21041B}"/>
+          </ac:spMkLst>
+        </pc:spChg>
+        <pc:picChg chg="add del mod">
+          <ac:chgData name="Li Lixiang" userId="6104bbfcb56aea79" providerId="LiveId" clId="{73E4B0B5-5950-4F20-8031-729779FF7831}" dt="2021-12-18T02:36:33.870" v="4319" actId="478"/>
+          <ac:picMkLst>
+            <pc:docMk/>
+            <pc:sldMk cId="2292814740" sldId="266"/>
+            <ac:picMk id="1026" creationId="{1CF67995-4C05-479D-B368-591E101E4A31}"/>
+          </ac:picMkLst>
+        </pc:picChg>
+        <pc:picChg chg="add mod">
+          <ac:chgData name="Li Lixiang" userId="6104bbfcb56aea79" providerId="LiveId" clId="{73E4B0B5-5950-4F20-8031-729779FF7831}" dt="2021-12-18T02:39:38.943" v="4607" actId="1076"/>
+          <ac:picMkLst>
+            <pc:docMk/>
+            <pc:sldMk cId="2292814740" sldId="266"/>
+            <ac:picMk id="1028" creationId="{8BCC912A-EE3A-46CE-BE27-F96A34C2A435}"/>
+          </ac:picMkLst>
+        </pc:picChg>
+      </pc:sldChg>
+      <pc:sldChg chg="modSp add mod ord">
+        <pc:chgData name="Li Lixiang" userId="6104bbfcb56aea79" providerId="LiveId" clId="{73E4B0B5-5950-4F20-8031-729779FF7831}" dt="2021-12-18T02:50:19.640" v="4759" actId="14100"/>
+        <pc:sldMkLst>
+          <pc:docMk/>
+          <pc:sldMk cId="3410867086" sldId="267"/>
+        </pc:sldMkLst>
+        <pc:spChg chg="mod">
+          <ac:chgData name="Li Lixiang" userId="6104bbfcb56aea79" providerId="LiveId" clId="{73E4B0B5-5950-4F20-8031-729779FF7831}" dt="2021-12-18T02:46:38.321" v="4615" actId="6549"/>
+          <ac:spMkLst>
+            <pc:docMk/>
+            <pc:sldMk cId="3410867086" sldId="267"/>
+            <ac:spMk id="2" creationId="{5A817F65-0249-4813-916F-D22CF5F41D8C}"/>
+          </ac:spMkLst>
+        </pc:spChg>
+        <pc:spChg chg="mod">
+          <ac:chgData name="Li Lixiang" userId="6104bbfcb56aea79" providerId="LiveId" clId="{73E4B0B5-5950-4F20-8031-729779FF7831}" dt="2021-12-18T02:50:19.640" v="4759" actId="14100"/>
+          <ac:spMkLst>
+            <pc:docMk/>
+            <pc:sldMk cId="3410867086" sldId="267"/>
+            <ac:spMk id="3" creationId="{588B000C-CCD7-42E0-A4A2-DB893ED55A0D}"/>
+          </ac:spMkLst>
+        </pc:spChg>
+        <pc:picChg chg="mod">
+          <ac:chgData name="Li Lixiang" userId="6104bbfcb56aea79" providerId="LiveId" clId="{73E4B0B5-5950-4F20-8031-729779FF7831}" dt="2021-12-18T02:48:41.069" v="4712" actId="1076"/>
+          <ac:picMkLst>
+            <pc:docMk/>
+            <pc:sldMk cId="3410867086" sldId="267"/>
+            <ac:picMk id="5" creationId="{88E84014-9E0B-432D-AAAC-4C1EC77C4D45}"/>
+          </ac:picMkLst>
+        </pc:picChg>
       </pc:sldChg>
       <pc:sldMasterChg chg="del delSldLayout">
         <pc:chgData name="Li Lixiang" userId="6104bbfcb56aea79" providerId="LiveId" clId="{73E4B0B5-5950-4F20-8031-729779FF7831}" dt="2021-08-28T02:45:18.450" v="2" actId="26606"/>
@@ -1328,7 +1488,7 @@
             <a:fld id="{A5B0A250-5CC0-1746-B209-08E8B0DAE6AF}" type="datetimeFigureOut">
               <a:rPr lang="en-US" smtClean="0"/>
               <a:pPr algn="l"/>
-              <a:t>10/11/2021</a:t>
+              <a:t>12/18/2021</a:t>
             </a:fld>
             <a:endParaRPr lang="en-US" dirty="0"/>
           </a:p>
@@ -1507,7 +1667,7 @@
           <a:p>
             <a:fld id="{A5B0A250-5CC0-1746-B209-08E8B0DAE6AF}" type="datetimeFigureOut">
               <a:rPr lang="en-US" smtClean="0"/>
-              <a:t>10/11/2021</a:t>
+              <a:t>12/18/2021</a:t>
             </a:fld>
             <a:endParaRPr lang="en-US" dirty="0"/>
           </a:p>
@@ -1687,7 +1847,7 @@
           <a:p>
             <a:fld id="{A5B0A250-5CC0-1746-B209-08E8B0DAE6AF}" type="datetimeFigureOut">
               <a:rPr lang="en-US" smtClean="0"/>
-              <a:t>10/11/2021</a:t>
+              <a:t>12/18/2021</a:t>
             </a:fld>
             <a:endParaRPr lang="en-US"/>
           </a:p>
@@ -1857,7 +2017,7 @@
           <a:p>
             <a:fld id="{A5B0A250-5CC0-1746-B209-08E8B0DAE6AF}" type="datetimeFigureOut">
               <a:rPr lang="en-US" smtClean="0"/>
-              <a:t>10/11/2021</a:t>
+              <a:t>12/18/2021</a:t>
             </a:fld>
             <a:endParaRPr lang="en-US" dirty="0"/>
           </a:p>
@@ -2170,7 +2330,7 @@
           <a:p>
             <a:fld id="{A5B0A250-5CC0-1746-B209-08E8B0DAE6AF}" type="datetimeFigureOut">
               <a:rPr lang="en-US" smtClean="0"/>
-              <a:t>10/11/2021</a:t>
+              <a:t>12/18/2021</a:t>
             </a:fld>
             <a:endParaRPr lang="en-US" dirty="0"/>
           </a:p>
@@ -2556,7 +2716,7 @@
           <a:p>
             <a:fld id="{A5B0A250-5CC0-1746-B209-08E8B0DAE6AF}" type="datetimeFigureOut">
               <a:rPr lang="en-US" smtClean="0"/>
-              <a:t>10/11/2021</a:t>
+              <a:t>12/18/2021</a:t>
             </a:fld>
             <a:endParaRPr lang="en-US" dirty="0"/>
           </a:p>
@@ -2990,7 +3150,7 @@
           <a:p>
             <a:fld id="{A5B0A250-5CC0-1746-B209-08E8B0DAE6AF}" type="datetimeFigureOut">
               <a:rPr lang="en-US" smtClean="0"/>
-              <a:t>10/11/2021</a:t>
+              <a:t>12/18/2021</a:t>
             </a:fld>
             <a:endParaRPr lang="en-US" dirty="0"/>
           </a:p>
@@ -3108,7 +3268,7 @@
           <a:p>
             <a:fld id="{A5B0A250-5CC0-1746-B209-08E8B0DAE6AF}" type="datetimeFigureOut">
               <a:rPr lang="en-US" smtClean="0"/>
-              <a:t>10/11/2021</a:t>
+              <a:t>12/18/2021</a:t>
             </a:fld>
             <a:endParaRPr lang="en-US" dirty="0"/>
           </a:p>
@@ -3204,7 +3364,7 @@
             <a:fld id="{A5B0A250-5CC0-1746-B209-08E8B0DAE6AF}" type="datetimeFigureOut">
               <a:rPr lang="en-US" smtClean="0"/>
               <a:pPr/>
-              <a:t>10/11/2021</a:t>
+              <a:t>12/18/2021</a:t>
             </a:fld>
             <a:endParaRPr lang="en-US" dirty="0"/>
           </a:p>
@@ -3555,7 +3715,7 @@
           <a:p>
             <a:fld id="{A5B0A250-5CC0-1746-B209-08E8B0DAE6AF}" type="datetimeFigureOut">
               <a:rPr lang="en-US" smtClean="0"/>
-              <a:t>10/11/2021</a:t>
+              <a:t>12/18/2021</a:t>
             </a:fld>
             <a:endParaRPr lang="en-US" dirty="0"/>
           </a:p>
@@ -3980,7 +4140,7 @@
           <a:p>
             <a:fld id="{A5B0A250-5CC0-1746-B209-08E8B0DAE6AF}" type="datetimeFigureOut">
               <a:rPr lang="en-US" smtClean="0"/>
-              <a:t>10/11/2021</a:t>
+              <a:t>12/18/2021</a:t>
             </a:fld>
             <a:endParaRPr lang="en-US" dirty="0"/>
           </a:p>
@@ -4262,7 +4422,7 @@
             <a:fld id="{A5B0A250-5CC0-1746-B209-08E8B0DAE6AF}" type="datetimeFigureOut">
               <a:rPr lang="en-US" smtClean="0"/>
               <a:pPr/>
-              <a:t>10/11/2021</a:t>
+              <a:t>12/18/2021</a:t>
             </a:fld>
             <a:endParaRPr lang="en-US" dirty="0"/>
           </a:p>
@@ -5390,6 +5550,379 @@
           <a:lstStyle/>
           <a:p>
             <a:r>
+              <a:rPr lang="en-US" dirty="0"/>
+              <a:t>Html basics</a:t>
+            </a:r>
+            <a:endParaRPr lang="en-MY" dirty="0"/>
+          </a:p>
+        </p:txBody>
+      </p:sp>
+      <p:sp>
+        <p:nvSpPr>
+          <p:cNvPr id="3" name="Content Placeholder 2">
+            <a:extLst>
+              <a:ext uri="{FF2B5EF4-FFF2-40B4-BE49-F238E27FC236}">
+                <a16:creationId xmlns:a16="http://schemas.microsoft.com/office/drawing/2014/main" id="{588B000C-CCD7-42E0-A4A2-DB893ED55A0D}"/>
+              </a:ext>
+            </a:extLst>
+          </p:cNvPr>
+          <p:cNvSpPr>
+            <a:spLocks noGrp="1"/>
+          </p:cNvSpPr>
+          <p:nvPr>
+            <p:ph idx="1"/>
+          </p:nvPr>
+        </p:nvSpPr>
+        <p:spPr/>
+        <p:txBody>
+          <a:bodyPr>
+            <a:normAutofit fontScale="92500" lnSpcReduction="10000"/>
+          </a:bodyPr>
+          <a:lstStyle/>
+          <a:p>
+            <a:r>
+              <a:rPr lang="en-US" dirty="0"/>
+              <a:t>Class and id</a:t>
+            </a:r>
+          </a:p>
+          <a:p>
+            <a:pPr lvl="1"/>
+            <a:r>
+              <a:rPr lang="en-US" dirty="0"/>
+              <a:t>A tag can have class attributes. One tag can have many classes. Also many tag can have same class</a:t>
+            </a:r>
+          </a:p>
+          <a:p>
+            <a:pPr lvl="1"/>
+            <a:r>
+              <a:rPr lang="en-US" dirty="0"/>
+              <a:t>A tag can have id attribute. The id must be unique inside the whole file.</a:t>
+            </a:r>
+          </a:p>
+          <a:p>
+            <a:r>
+              <a:rPr lang="en-US" dirty="0"/>
+              <a:t>Styling to class and id</a:t>
+            </a:r>
+          </a:p>
+          <a:p>
+            <a:pPr lvl="1"/>
+            <a:r>
+              <a:rPr lang="en-US" dirty="0"/>
+              <a:t>The styling is not restricted to tags. Better practice is to give style to class, or id</a:t>
+            </a:r>
+          </a:p>
+          <a:p>
+            <a:pPr lvl="1"/>
+            <a:r>
+              <a:rPr lang="en-US" dirty="0"/>
+              <a:t>Then in html body, you give class to different tag.</a:t>
+            </a:r>
+          </a:p>
+          <a:p>
+            <a:r>
+              <a:rPr lang="en-US" dirty="0"/>
+              <a:t>Grouping of many</a:t>
+            </a:r>
+          </a:p>
+          <a:p>
+            <a:pPr lvl="1"/>
+            <a:r>
+              <a:rPr lang="en-US" dirty="0"/>
+              <a:t>&lt;div&gt;&lt;/div&gt; is used to group many tag (sections, text paragraphs), and assign a class to it can style for all of them</a:t>
+            </a:r>
+          </a:p>
+          <a:p>
+            <a:r>
+              <a:rPr lang="en-US" dirty="0"/>
+              <a:t>Picking part</a:t>
+            </a:r>
+          </a:p>
+          <a:p>
+            <a:pPr lvl="1"/>
+            <a:r>
+              <a:rPr lang="en-US" dirty="0"/>
+              <a:t>&lt;span&gt;&lt;/span&gt; is used to picking up some of the text inline, and assign a class to it can style for only this part of text</a:t>
+            </a:r>
+          </a:p>
+        </p:txBody>
+      </p:sp>
+    </p:spTree>
+    <p:extLst>
+      <p:ext uri="{BB962C8B-B14F-4D97-AF65-F5344CB8AC3E}">
+        <p14:creationId xmlns:p14="http://schemas.microsoft.com/office/powerpoint/2010/main" val="3858986464"/>
+      </p:ext>
+    </p:extLst>
+  </p:cSld>
+  <p:clrMapOvr>
+    <a:masterClrMapping/>
+  </p:clrMapOvr>
+</p:sld>
+</file>
+
+<file path=ppt/slides/slide11.xml><?xml version="1.0" encoding="utf-8"?>
+<p:sld xmlns:a="http://schemas.openxmlformats.org/drawingml/2006/main" xmlns:r="http://schemas.openxmlformats.org/officeDocument/2006/relationships" xmlns:p="http://schemas.openxmlformats.org/presentationml/2006/main">
+  <p:cSld>
+    <p:spTree>
+      <p:nvGrpSpPr>
+        <p:cNvPr id="1" name=""/>
+        <p:cNvGrpSpPr/>
+        <p:nvPr/>
+      </p:nvGrpSpPr>
+      <p:grpSpPr>
+        <a:xfrm>
+          <a:off x="0" y="0"/>
+          <a:ext cx="0" cy="0"/>
+          <a:chOff x="0" y="0"/>
+          <a:chExt cx="0" cy="0"/>
+        </a:xfrm>
+      </p:grpSpPr>
+      <p:sp>
+        <p:nvSpPr>
+          <p:cNvPr id="2" name="Title 1">
+            <a:extLst>
+              <a:ext uri="{FF2B5EF4-FFF2-40B4-BE49-F238E27FC236}">
+                <a16:creationId xmlns:a16="http://schemas.microsoft.com/office/drawing/2014/main" id="{5A817F65-0249-4813-916F-D22CF5F41D8C}"/>
+              </a:ext>
+            </a:extLst>
+          </p:cNvPr>
+          <p:cNvSpPr>
+            <a:spLocks noGrp="1"/>
+          </p:cNvSpPr>
+          <p:nvPr>
+            <p:ph type="title"/>
+          </p:nvPr>
+        </p:nvSpPr>
+        <p:spPr/>
+        <p:txBody>
+          <a:bodyPr/>
+          <a:lstStyle/>
+          <a:p>
+            <a:r>
+              <a:rPr lang="en-US" dirty="0"/>
+              <a:t>Other html tags</a:t>
+            </a:r>
+            <a:endParaRPr lang="en-MY" dirty="0"/>
+          </a:p>
+        </p:txBody>
+      </p:sp>
+      <p:sp>
+        <p:nvSpPr>
+          <p:cNvPr id="3" name="Content Placeholder 2">
+            <a:extLst>
+              <a:ext uri="{FF2B5EF4-FFF2-40B4-BE49-F238E27FC236}">
+                <a16:creationId xmlns:a16="http://schemas.microsoft.com/office/drawing/2014/main" id="{588B000C-CCD7-42E0-A4A2-DB893ED55A0D}"/>
+              </a:ext>
+            </a:extLst>
+          </p:cNvPr>
+          <p:cNvSpPr>
+            <a:spLocks noGrp="1"/>
+          </p:cNvSpPr>
+          <p:nvPr>
+            <p:ph idx="1"/>
+          </p:nvPr>
+        </p:nvSpPr>
+        <p:spPr>
+          <a:xfrm>
+            <a:off x="1069848" y="1917577"/>
+            <a:ext cx="10058400" cy="4527611"/>
+          </a:xfrm>
+        </p:spPr>
+        <p:txBody>
+          <a:bodyPr>
+            <a:normAutofit/>
+          </a:bodyPr>
+          <a:lstStyle/>
+          <a:p>
+            <a:r>
+              <a:rPr lang="en-US" dirty="0"/>
+              <a:t>Bullet-points</a:t>
+            </a:r>
+          </a:p>
+          <a:p>
+            <a:pPr lvl="1"/>
+            <a:r>
+              <a:rPr lang="en-US" dirty="0"/>
+              <a:t>&lt;ul&gt; &lt;/ul&gt;for unordered list. &lt;li&gt; for list item</a:t>
+            </a:r>
+          </a:p>
+          <a:p>
+            <a:pPr lvl="1"/>
+            <a:r>
+              <a:rPr lang="en-US" dirty="0"/>
+              <a:t>&lt;</a:t>
+            </a:r>
+            <a:r>
+              <a:rPr lang="en-US" dirty="0" err="1"/>
+              <a:t>ol</a:t>
+            </a:r>
+            <a:r>
+              <a:rPr lang="en-US" dirty="0"/>
+              <a:t>&gt; &lt;/</a:t>
+            </a:r>
+            <a:r>
+              <a:rPr lang="en-US" dirty="0" err="1"/>
+              <a:t>ol</a:t>
+            </a:r>
+            <a:r>
+              <a:rPr lang="en-US" dirty="0"/>
+              <a:t>&gt;for ordered list. &lt;li&gt; for list item</a:t>
+            </a:r>
+          </a:p>
+          <a:p>
+            <a:r>
+              <a:rPr lang="en-US" dirty="0"/>
+              <a:t>Table</a:t>
+            </a:r>
+          </a:p>
+          <a:p>
+            <a:pPr lvl="1"/>
+            <a:r>
+              <a:rPr lang="en-US" dirty="0"/>
+              <a:t>&lt;table&gt;&lt;/table&gt;</a:t>
+            </a:r>
+          </a:p>
+          <a:p>
+            <a:pPr lvl="1"/>
+            <a:r>
+              <a:rPr lang="en-US" dirty="0"/>
+              <a:t>&lt;tr&gt; &lt;/tr&gt;, for table row</a:t>
+            </a:r>
+          </a:p>
+          <a:p>
+            <a:pPr lvl="1"/>
+            <a:r>
+              <a:rPr lang="en-US" dirty="0"/>
+              <a:t>&lt;td&gt; &lt;/td&gt;, for table cell</a:t>
+            </a:r>
+          </a:p>
+          <a:p>
+            <a:pPr lvl="1"/>
+            <a:r>
+              <a:rPr lang="en-US" dirty="0"/>
+              <a:t>&lt;</a:t>
+            </a:r>
+            <a:r>
+              <a:rPr lang="en-US" dirty="0" err="1"/>
+              <a:t>th</a:t>
+            </a:r>
+            <a:r>
+              <a:rPr lang="en-US" dirty="0"/>
+              <a:t>&gt; &lt;/</a:t>
+            </a:r>
+            <a:r>
+              <a:rPr lang="en-US" dirty="0" err="1"/>
+              <a:t>th</a:t>
+            </a:r>
+            <a:r>
+              <a:rPr lang="en-US" dirty="0"/>
+              <a:t>&gt;, make one cell as table header</a:t>
+            </a:r>
+          </a:p>
+          <a:p>
+            <a:r>
+              <a:rPr lang="en-US" dirty="0"/>
+              <a:t>Image</a:t>
+            </a:r>
+          </a:p>
+          <a:p>
+            <a:pPr lvl="1"/>
+            <a:r>
+              <a:rPr lang="en-US" dirty="0"/>
+              <a:t>&lt;</a:t>
+            </a:r>
+            <a:r>
+              <a:rPr lang="en-US" dirty="0" err="1"/>
+              <a:t>img</a:t>
+            </a:r>
+            <a:r>
+              <a:rPr lang="en-US" dirty="0"/>
+              <a:t>&gt; with </a:t>
+            </a:r>
+            <a:r>
+              <a:rPr lang="en-US" dirty="0" err="1"/>
+              <a:t>src</a:t>
+            </a:r>
+            <a:r>
+              <a:rPr lang="en-US" dirty="0"/>
+              <a:t> attributes to specify loading image file</a:t>
+            </a:r>
+          </a:p>
+          <a:p>
+            <a:r>
+              <a:rPr lang="en-US" dirty="0"/>
+              <a:t>Hyperlinks</a:t>
+            </a:r>
+          </a:p>
+          <a:p>
+            <a:pPr lvl="1"/>
+            <a:r>
+              <a:rPr lang="en-US" dirty="0"/>
+              <a:t>&lt;a&gt; &lt;/a&gt; with </a:t>
+            </a:r>
+            <a:r>
+              <a:rPr lang="en-US" dirty="0" err="1"/>
+              <a:t>href</a:t>
+            </a:r>
+            <a:r>
+              <a:rPr lang="en-US" dirty="0"/>
+              <a:t> attributes to specify a linking URL</a:t>
+            </a:r>
+          </a:p>
+        </p:txBody>
+      </p:sp>
+    </p:spTree>
+    <p:extLst>
+      <p:ext uri="{BB962C8B-B14F-4D97-AF65-F5344CB8AC3E}">
+        <p14:creationId xmlns:p14="http://schemas.microsoft.com/office/powerpoint/2010/main" val="1584354543"/>
+      </p:ext>
+    </p:extLst>
+  </p:cSld>
+  <p:clrMapOvr>
+    <a:masterClrMapping/>
+  </p:clrMapOvr>
+</p:sld>
+</file>
+
+<file path=ppt/slides/slide12.xml><?xml version="1.0" encoding="utf-8"?>
+<p:sld xmlns:a="http://schemas.openxmlformats.org/drawingml/2006/main" xmlns:r="http://schemas.openxmlformats.org/officeDocument/2006/relationships" xmlns:p="http://schemas.openxmlformats.org/presentationml/2006/main">
+  <p:cSld>
+    <p:spTree>
+      <p:nvGrpSpPr>
+        <p:cNvPr id="1" name=""/>
+        <p:cNvGrpSpPr/>
+        <p:nvPr/>
+      </p:nvGrpSpPr>
+      <p:grpSpPr>
+        <a:xfrm>
+          <a:off x="0" y="0"/>
+          <a:ext cx="0" cy="0"/>
+          <a:chOff x="0" y="0"/>
+          <a:chExt cx="0" cy="0"/>
+        </a:xfrm>
+      </p:grpSpPr>
+      <p:sp>
+        <p:nvSpPr>
+          <p:cNvPr id="2" name="Title 1">
+            <a:extLst>
+              <a:ext uri="{FF2B5EF4-FFF2-40B4-BE49-F238E27FC236}">
+                <a16:creationId xmlns:a16="http://schemas.microsoft.com/office/drawing/2014/main" id="{5A817F65-0249-4813-916F-D22CF5F41D8C}"/>
+              </a:ext>
+            </a:extLst>
+          </p:cNvPr>
+          <p:cNvSpPr>
+            <a:spLocks noGrp="1"/>
+          </p:cNvSpPr>
+          <p:nvPr>
+            <p:ph type="title"/>
+          </p:nvPr>
+        </p:nvSpPr>
+        <p:spPr/>
+        <p:txBody>
+          <a:bodyPr/>
+          <a:lstStyle/>
+          <a:p>
+            <a:r>
               <a:rPr lang="en-US" dirty="0" err="1"/>
               <a:t>Css</a:t>
             </a:r>
@@ -5873,7 +6406,40 @@
                 </a:solidFill>
                 <a:latin typeface="Rockwell (Body)"/>
               </a:rPr>
-              <a:t>We only see the URL at the browser address bar. The actual http request is not shown by the browser</a:t>
+              <a:t>We only see the URL at the browser address bar. The actual http request is not shown by the browser.</a:t>
+            </a:r>
+          </a:p>
+          <a:p>
+            <a:r>
+              <a:rPr lang="en-MY" dirty="0">
+                <a:solidFill>
+                  <a:srgbClr val="1B1B1B"/>
+                </a:solidFill>
+                <a:latin typeface="Rockwell (Body)"/>
+              </a:rPr>
+              <a:t>Protocol are also sometimes called ‘scheme’</a:t>
+            </a:r>
+          </a:p>
+          <a:p>
+            <a:r>
+              <a:rPr lang="en-MY" dirty="0">
+                <a:solidFill>
+                  <a:srgbClr val="1B1B1B"/>
+                </a:solidFill>
+                <a:latin typeface="Rockwell (Body)"/>
+              </a:rPr>
+              <a:t>Domain name sometimes also called ‘site’ or ‘address’ or ‘hostname’</a:t>
+            </a:r>
+          </a:p>
+          <a:p>
+            <a:r>
+              <a:rPr lang="en-MY" dirty="0">
+                <a:solidFill>
+                  <a:srgbClr val="1B1B1B"/>
+                </a:solidFill>
+                <a:latin typeface="Rockwell (Body)"/>
+              </a:rPr>
+              <a:t>Resource are sometimes also called ‘path’. </a:t>
             </a:r>
           </a:p>
         </p:txBody>
@@ -6007,7 +6573,7 @@
           <p:cNvPr id="2" name="Title 1">
             <a:extLst>
               <a:ext uri="{FF2B5EF4-FFF2-40B4-BE49-F238E27FC236}">
-                <a16:creationId xmlns:a16="http://schemas.microsoft.com/office/drawing/2014/main" id="{5A817F65-0249-4813-916F-D22CF5F41D8C}"/>
+                <a16:creationId xmlns:a16="http://schemas.microsoft.com/office/drawing/2014/main" id="{869DD70D-D398-49E8-AE58-30C33CCF17D9}"/>
               </a:ext>
             </a:extLst>
           </p:cNvPr>
@@ -6025,7 +6591,7 @@
           <a:p>
             <a:r>
               <a:rPr lang="en-US" dirty="0"/>
-              <a:t>Request and response</a:t>
+              <a:t>DNS</a:t>
             </a:r>
             <a:endParaRPr lang="en-MY" dirty="0"/>
           </a:p>
@@ -6036,7 +6602,7 @@
           <p:cNvPr id="3" name="Content Placeholder 2">
             <a:extLst>
               <a:ext uri="{FF2B5EF4-FFF2-40B4-BE49-F238E27FC236}">
-                <a16:creationId xmlns:a16="http://schemas.microsoft.com/office/drawing/2014/main" id="{588B000C-CCD7-42E0-A4A2-DB893ED55A0D}"/>
+                <a16:creationId xmlns:a16="http://schemas.microsoft.com/office/drawing/2014/main" id="{11900CA0-561C-4846-A795-A67DA9694DD0}"/>
               </a:ext>
             </a:extLst>
           </p:cNvPr>
@@ -6049,125 +6615,34 @@
         </p:nvSpPr>
         <p:spPr>
           <a:xfrm>
-            <a:off x="1063752" y="1862145"/>
-            <a:ext cx="5765774" cy="4377046"/>
+            <a:off x="1069848" y="2121408"/>
+            <a:ext cx="5540502" cy="2041017"/>
           </a:xfrm>
         </p:spPr>
         <p:txBody>
-          <a:bodyPr>
-            <a:normAutofit/>
-          </a:bodyPr>
+          <a:bodyPr/>
           <a:lstStyle/>
           <a:p>
-            <a:pPr algn="l"/>
-            <a:r>
-              <a:rPr lang="en-MY" b="0" i="0" dirty="0">
-                <a:solidFill>
-                  <a:srgbClr val="303030"/>
-                </a:solidFill>
-                <a:effectLst/>
-                <a:latin typeface="Rockwell (Body)"/>
-              </a:rPr>
-              <a:t>A </a:t>
-            </a:r>
-            <a:r>
-              <a:rPr lang="en-MY" b="1" i="0" dirty="0">
-                <a:solidFill>
-                  <a:srgbClr val="303030"/>
-                </a:solidFill>
-                <a:effectLst/>
-                <a:latin typeface="Rockwell (Body)"/>
-              </a:rPr>
-              <a:t>request</a:t>
-            </a:r>
-            <a:r>
-              <a:rPr lang="en-MY" b="0" i="0" dirty="0">
-                <a:solidFill>
-                  <a:srgbClr val="303030"/>
-                </a:solidFill>
-                <a:effectLst/>
-                <a:latin typeface="Rockwell (Body)"/>
-              </a:rPr>
-              <a:t> consists of:</a:t>
-            </a:r>
-          </a:p>
-          <a:p>
-            <a:pPr lvl="1"/>
-            <a:r>
-              <a:rPr lang="en-MY" i="0" dirty="0">
-                <a:solidFill>
-                  <a:srgbClr val="303030"/>
-                </a:solidFill>
-                <a:effectLst/>
-                <a:latin typeface="Rockwell (Body)"/>
-              </a:rPr>
-              <a:t>A command or request + optional headers + optional body content.</a:t>
-            </a:r>
-          </a:p>
-          <a:p>
-            <a:pPr algn="l"/>
-            <a:r>
-              <a:rPr lang="en-MY" b="0" i="0" dirty="0">
-                <a:solidFill>
-                  <a:srgbClr val="303030"/>
-                </a:solidFill>
-                <a:effectLst/>
-                <a:latin typeface="Rockwell (Body)"/>
-              </a:rPr>
-              <a:t>A </a:t>
-            </a:r>
-            <a:r>
-              <a:rPr lang="en-MY" b="1" i="0" dirty="0">
-                <a:solidFill>
-                  <a:srgbClr val="303030"/>
-                </a:solidFill>
-                <a:effectLst/>
-                <a:latin typeface="Rockwell (Body)"/>
-              </a:rPr>
-              <a:t>response</a:t>
-            </a:r>
-            <a:r>
-              <a:rPr lang="en-MY" b="0" i="0" dirty="0">
-                <a:solidFill>
-                  <a:srgbClr val="303030"/>
-                </a:solidFill>
-                <a:effectLst/>
-                <a:latin typeface="Rockwell (Body)"/>
-              </a:rPr>
-              <a:t> consists of:</a:t>
-            </a:r>
-          </a:p>
-          <a:p>
-            <a:pPr lvl="1"/>
-            <a:r>
-              <a:rPr lang="en-MY" i="0" dirty="0">
-                <a:solidFill>
-                  <a:srgbClr val="303030"/>
-                </a:solidFill>
-                <a:effectLst/>
-                <a:latin typeface="Rockwell (Body)"/>
-              </a:rPr>
-              <a:t>A status code + optional headers + optional body content.</a:t>
-            </a:r>
-          </a:p>
-          <a:p>
-            <a:pPr lvl="1"/>
-            <a:endParaRPr lang="en-MY" b="0" i="0" dirty="0">
-              <a:solidFill>
-                <a:srgbClr val="303030"/>
-              </a:solidFill>
-              <a:effectLst/>
-              <a:latin typeface="Rockwell (Body)"/>
-            </a:endParaRPr>
+            <a:r>
+              <a:rPr lang="en-US" dirty="0"/>
+              <a:t>Before you can use your favorite browser to find any contents from the server, you need to know that on the back, the browser need to find out the address of the server first.</a:t>
+            </a:r>
+          </a:p>
+          <a:p>
+            <a:r>
+              <a:rPr lang="en-US" dirty="0"/>
+              <a:t>This was done using DNS. (Domain Name Service)</a:t>
+            </a:r>
+            <a:endParaRPr lang="en-MY" dirty="0"/>
           </a:p>
         </p:txBody>
       </p:sp>
       <p:pic>
         <p:nvPicPr>
-          <p:cNvPr id="1030" name="Picture 6">
+          <p:cNvPr id="1028" name="Picture 4" descr="See the source image">
             <a:extLst>
               <a:ext uri="{FF2B5EF4-FFF2-40B4-BE49-F238E27FC236}">
-                <a16:creationId xmlns:a16="http://schemas.microsoft.com/office/drawing/2014/main" id="{5FBD96A7-0060-4A0F-9A25-8E1008BB9C90}"/>
+                <a16:creationId xmlns:a16="http://schemas.microsoft.com/office/drawing/2014/main" id="{8BCC912A-EE3A-46CE-BE27-F96A34C2A435}"/>
               </a:ext>
             </a:extLst>
           </p:cNvPr>
@@ -6191,8 +6666,8 @@
         </p:blipFill>
         <p:spPr bwMode="auto">
           <a:xfrm>
-            <a:off x="6835623" y="1130560"/>
-            <a:ext cx="4943475" cy="4876800"/>
+            <a:off x="7096517" y="2093976"/>
+            <a:ext cx="3930385" cy="3035806"/>
           </a:xfrm>
           <a:prstGeom prst="rect">
             <a:avLst/>
@@ -6209,6 +6684,506 @@
           </a:extLst>
         </p:spPr>
       </p:pic>
+      <p:sp>
+        <p:nvSpPr>
+          <p:cNvPr id="4" name="Rectangle 3">
+            <a:extLst>
+              <a:ext uri="{FF2B5EF4-FFF2-40B4-BE49-F238E27FC236}">
+                <a16:creationId xmlns:a16="http://schemas.microsoft.com/office/drawing/2014/main" id="{884911C1-D7E4-4EBC-9EA0-58C00D21041B}"/>
+              </a:ext>
+            </a:extLst>
+          </p:cNvPr>
+          <p:cNvSpPr/>
+          <p:nvPr/>
+        </p:nvSpPr>
+        <p:spPr>
+          <a:xfrm>
+            <a:off x="7553325" y="3290696"/>
+            <a:ext cx="3368412" cy="1743075"/>
+          </a:xfrm>
+          <a:prstGeom prst="rect">
+            <a:avLst/>
+          </a:prstGeom>
+          <a:noFill/>
+          <a:ln w="28575"/>
+        </p:spPr>
+        <p:style>
+          <a:lnRef idx="2">
+            <a:schemeClr val="accent1">
+              <a:shade val="50000"/>
+            </a:schemeClr>
+          </a:lnRef>
+          <a:fillRef idx="1">
+            <a:schemeClr val="accent1"/>
+          </a:fillRef>
+          <a:effectRef idx="0">
+            <a:schemeClr val="accent1"/>
+          </a:effectRef>
+          <a:fontRef idx="minor">
+            <a:schemeClr val="lt1"/>
+          </a:fontRef>
+        </p:style>
+        <p:txBody>
+          <a:bodyPr rtlCol="0" anchor="ctr"/>
+          <a:lstStyle/>
+          <a:p>
+            <a:pPr algn="ctr"/>
+            <a:endParaRPr lang="en-MY"/>
+          </a:p>
+        </p:txBody>
+      </p:sp>
+    </p:spTree>
+    <p:extLst>
+      <p:ext uri="{BB962C8B-B14F-4D97-AF65-F5344CB8AC3E}">
+        <p14:creationId xmlns:p14="http://schemas.microsoft.com/office/powerpoint/2010/main" val="2292814740"/>
+      </p:ext>
+    </p:extLst>
+  </p:cSld>
+  <p:clrMapOvr>
+    <a:masterClrMapping/>
+  </p:clrMapOvr>
+</p:sld>
+</file>
+
+<file path=ppt/slides/slide5.xml><?xml version="1.0" encoding="utf-8"?>
+<p:sld xmlns:a="http://schemas.openxmlformats.org/drawingml/2006/main" xmlns:r="http://schemas.openxmlformats.org/officeDocument/2006/relationships" xmlns:p="http://schemas.openxmlformats.org/presentationml/2006/main">
+  <p:cSld>
+    <p:spTree>
+      <p:nvGrpSpPr>
+        <p:cNvPr id="1" name=""/>
+        <p:cNvGrpSpPr/>
+        <p:nvPr/>
+      </p:nvGrpSpPr>
+      <p:grpSpPr>
+        <a:xfrm>
+          <a:off x="0" y="0"/>
+          <a:ext cx="0" cy="0"/>
+          <a:chOff x="0" y="0"/>
+          <a:chExt cx="0" cy="0"/>
+        </a:xfrm>
+      </p:grpSpPr>
+      <p:sp>
+        <p:nvSpPr>
+          <p:cNvPr id="2" name="Title 1">
+            <a:extLst>
+              <a:ext uri="{FF2B5EF4-FFF2-40B4-BE49-F238E27FC236}">
+                <a16:creationId xmlns:a16="http://schemas.microsoft.com/office/drawing/2014/main" id="{5A817F65-0249-4813-916F-D22CF5F41D8C}"/>
+              </a:ext>
+            </a:extLst>
+          </p:cNvPr>
+          <p:cNvSpPr>
+            <a:spLocks noGrp="1"/>
+          </p:cNvSpPr>
+          <p:nvPr>
+            <p:ph type="title"/>
+          </p:nvPr>
+        </p:nvSpPr>
+        <p:spPr/>
+        <p:txBody>
+          <a:bodyPr/>
+          <a:lstStyle/>
+          <a:p>
+            <a:r>
+              <a:rPr lang="en-US" dirty="0"/>
+              <a:t>Request</a:t>
+            </a:r>
+            <a:endParaRPr lang="en-MY" dirty="0"/>
+          </a:p>
+        </p:txBody>
+      </p:sp>
+      <p:sp>
+        <p:nvSpPr>
+          <p:cNvPr id="3" name="Content Placeholder 2">
+            <a:extLst>
+              <a:ext uri="{FF2B5EF4-FFF2-40B4-BE49-F238E27FC236}">
+                <a16:creationId xmlns:a16="http://schemas.microsoft.com/office/drawing/2014/main" id="{588B000C-CCD7-42E0-A4A2-DB893ED55A0D}"/>
+              </a:ext>
+            </a:extLst>
+          </p:cNvPr>
+          <p:cNvSpPr>
+            <a:spLocks noGrp="1"/>
+          </p:cNvSpPr>
+          <p:nvPr>
+            <p:ph idx="1"/>
+          </p:nvPr>
+        </p:nvSpPr>
+        <p:spPr>
+          <a:xfrm>
+            <a:off x="1063751" y="1862145"/>
+            <a:ext cx="5956173" cy="2319330"/>
+          </a:xfrm>
+        </p:spPr>
+        <p:txBody>
+          <a:bodyPr>
+            <a:normAutofit/>
+          </a:bodyPr>
+          <a:lstStyle/>
+          <a:p>
+            <a:pPr algn="l"/>
+            <a:r>
+              <a:rPr lang="en-MY" b="0" i="0" dirty="0">
+                <a:solidFill>
+                  <a:srgbClr val="303030"/>
+                </a:solidFill>
+                <a:effectLst/>
+                <a:latin typeface="Rockwell (Body)"/>
+              </a:rPr>
+              <a:t>A </a:t>
+            </a:r>
+            <a:r>
+              <a:rPr lang="en-MY" b="1" i="0" dirty="0">
+                <a:solidFill>
+                  <a:srgbClr val="303030"/>
+                </a:solidFill>
+                <a:effectLst/>
+                <a:latin typeface="Rockwell (Body)"/>
+              </a:rPr>
+              <a:t>request</a:t>
+            </a:r>
+            <a:r>
+              <a:rPr lang="en-MY" b="0" i="0" dirty="0">
+                <a:solidFill>
+                  <a:srgbClr val="303030"/>
+                </a:solidFill>
+                <a:effectLst/>
+                <a:latin typeface="Rockwell (Body)"/>
+              </a:rPr>
+              <a:t> consists of:</a:t>
+            </a:r>
+          </a:p>
+          <a:p>
+            <a:pPr lvl="1"/>
+            <a:r>
+              <a:rPr lang="en-MY" i="0" dirty="0">
+                <a:solidFill>
+                  <a:srgbClr val="303030"/>
+                </a:solidFill>
+                <a:effectLst/>
+                <a:latin typeface="Rockwell (Body)"/>
+              </a:rPr>
+              <a:t>Request line with: method, path, protocol</a:t>
+            </a:r>
+          </a:p>
+          <a:p>
+            <a:pPr lvl="1"/>
+            <a:r>
+              <a:rPr lang="en-MY" i="0" dirty="0">
+                <a:solidFill>
+                  <a:srgbClr val="303030"/>
+                </a:solidFill>
+                <a:effectLst/>
+                <a:latin typeface="Rockwell (Body)"/>
+              </a:rPr>
+              <a:t> + optional headers (as </a:t>
+            </a:r>
+            <a:r>
+              <a:rPr lang="en-MY" i="0" dirty="0" err="1">
+                <a:solidFill>
+                  <a:srgbClr val="303030"/>
+                </a:solidFill>
+                <a:effectLst/>
+                <a:latin typeface="Rockwell (Body)"/>
+              </a:rPr>
+              <a:t>Name:Value</a:t>
+            </a:r>
+            <a:r>
+              <a:rPr lang="en-MY" i="0" dirty="0">
+                <a:solidFill>
+                  <a:srgbClr val="303030"/>
+                </a:solidFill>
+                <a:effectLst/>
+                <a:latin typeface="Rockwell (Body)"/>
+              </a:rPr>
+              <a:t> pairs)</a:t>
+            </a:r>
+          </a:p>
+          <a:p>
+            <a:pPr lvl="1"/>
+            <a:r>
+              <a:rPr lang="en-MY" i="0" dirty="0">
+                <a:solidFill>
+                  <a:srgbClr val="303030"/>
+                </a:solidFill>
+                <a:effectLst/>
+                <a:latin typeface="Rockwell (Body)"/>
+              </a:rPr>
+              <a:t> + optional body content.</a:t>
+            </a:r>
+          </a:p>
+          <a:p>
+            <a:pPr lvl="1"/>
+            <a:endParaRPr lang="en-MY" b="0" i="0" dirty="0">
+              <a:solidFill>
+                <a:srgbClr val="303030"/>
+              </a:solidFill>
+              <a:effectLst/>
+              <a:latin typeface="Rockwell (Body)"/>
+            </a:endParaRPr>
+          </a:p>
+        </p:txBody>
+      </p:sp>
+      <p:pic>
+        <p:nvPicPr>
+          <p:cNvPr id="5" name="Picture 4" descr="Diagram&#10;&#10;Description automatically generated with medium confidence">
+            <a:extLst>
+              <a:ext uri="{FF2B5EF4-FFF2-40B4-BE49-F238E27FC236}">
+                <a16:creationId xmlns:a16="http://schemas.microsoft.com/office/drawing/2014/main" id="{88E84014-9E0B-432D-AAAC-4C1EC77C4D45}"/>
+              </a:ext>
+            </a:extLst>
+          </p:cNvPr>
+          <p:cNvPicPr>
+            <a:picLocks noChangeAspect="1"/>
+          </p:cNvPicPr>
+          <p:nvPr/>
+        </p:nvPicPr>
+        <p:blipFill>
+          <a:blip r:embed="rId2">
+            <a:extLst>
+              <a:ext uri="{28A0092B-C50C-407E-A947-70E740481C1C}">
+                <a14:useLocalDpi xmlns:a14="http://schemas.microsoft.com/office/drawing/2010/main" val="0"/>
+              </a:ext>
+            </a:extLst>
+          </a:blip>
+          <a:stretch>
+            <a:fillRect/>
+          </a:stretch>
+        </p:blipFill>
+        <p:spPr>
+          <a:xfrm>
+            <a:off x="4786827" y="3704621"/>
+            <a:ext cx="7211485" cy="2429479"/>
+          </a:xfrm>
+          <a:prstGeom prst="rect">
+            <a:avLst/>
+          </a:prstGeom>
+        </p:spPr>
+      </p:pic>
+    </p:spTree>
+    <p:extLst>
+      <p:ext uri="{BB962C8B-B14F-4D97-AF65-F5344CB8AC3E}">
+        <p14:creationId xmlns:p14="http://schemas.microsoft.com/office/powerpoint/2010/main" val="3410867086"/>
+      </p:ext>
+    </p:extLst>
+  </p:cSld>
+  <p:clrMapOvr>
+    <a:masterClrMapping/>
+  </p:clrMapOvr>
+</p:sld>
+</file>
+
+<file path=ppt/slides/slide6.xml><?xml version="1.0" encoding="utf-8"?>
+<p:sld xmlns:a="http://schemas.openxmlformats.org/drawingml/2006/main" xmlns:r="http://schemas.openxmlformats.org/officeDocument/2006/relationships" xmlns:p="http://schemas.openxmlformats.org/presentationml/2006/main">
+  <p:cSld>
+    <p:spTree>
+      <p:nvGrpSpPr>
+        <p:cNvPr id="1" name=""/>
+        <p:cNvGrpSpPr/>
+        <p:nvPr/>
+      </p:nvGrpSpPr>
+      <p:grpSpPr>
+        <a:xfrm>
+          <a:off x="0" y="0"/>
+          <a:ext cx="0" cy="0"/>
+          <a:chOff x="0" y="0"/>
+          <a:chExt cx="0" cy="0"/>
+        </a:xfrm>
+      </p:grpSpPr>
+      <p:sp>
+        <p:nvSpPr>
+          <p:cNvPr id="2" name="Title 1">
+            <a:extLst>
+              <a:ext uri="{FF2B5EF4-FFF2-40B4-BE49-F238E27FC236}">
+                <a16:creationId xmlns:a16="http://schemas.microsoft.com/office/drawing/2014/main" id="{5A817F65-0249-4813-916F-D22CF5F41D8C}"/>
+              </a:ext>
+            </a:extLst>
+          </p:cNvPr>
+          <p:cNvSpPr>
+            <a:spLocks noGrp="1"/>
+          </p:cNvSpPr>
+          <p:nvPr>
+            <p:ph type="title"/>
+          </p:nvPr>
+        </p:nvSpPr>
+        <p:spPr/>
+        <p:txBody>
+          <a:bodyPr/>
+          <a:lstStyle/>
+          <a:p>
+            <a:r>
+              <a:rPr lang="en-US" dirty="0"/>
+              <a:t>response</a:t>
+            </a:r>
+            <a:endParaRPr lang="en-MY" dirty="0"/>
+          </a:p>
+        </p:txBody>
+      </p:sp>
+      <p:sp>
+        <p:nvSpPr>
+          <p:cNvPr id="3" name="Content Placeholder 2">
+            <a:extLst>
+              <a:ext uri="{FF2B5EF4-FFF2-40B4-BE49-F238E27FC236}">
+                <a16:creationId xmlns:a16="http://schemas.microsoft.com/office/drawing/2014/main" id="{588B000C-CCD7-42E0-A4A2-DB893ED55A0D}"/>
+              </a:ext>
+            </a:extLst>
+          </p:cNvPr>
+          <p:cNvSpPr>
+            <a:spLocks noGrp="1"/>
+          </p:cNvSpPr>
+          <p:nvPr>
+            <p:ph idx="1"/>
+          </p:nvPr>
+        </p:nvSpPr>
+        <p:spPr>
+          <a:xfrm>
+            <a:off x="1063752" y="1862145"/>
+            <a:ext cx="6213348" cy="1609345"/>
+          </a:xfrm>
+        </p:spPr>
+        <p:txBody>
+          <a:bodyPr>
+            <a:normAutofit/>
+          </a:bodyPr>
+          <a:lstStyle/>
+          <a:p>
+            <a:pPr algn="l"/>
+            <a:r>
+              <a:rPr lang="en-MY" b="0" i="0" dirty="0">
+                <a:solidFill>
+                  <a:srgbClr val="303030"/>
+                </a:solidFill>
+                <a:effectLst/>
+                <a:latin typeface="Rockwell (Body)"/>
+              </a:rPr>
+              <a:t>A </a:t>
+            </a:r>
+            <a:r>
+              <a:rPr lang="en-MY" b="1" i="0" dirty="0">
+                <a:solidFill>
+                  <a:srgbClr val="303030"/>
+                </a:solidFill>
+                <a:effectLst/>
+                <a:latin typeface="Rockwell (Body)"/>
+              </a:rPr>
+              <a:t>response</a:t>
+            </a:r>
+            <a:r>
+              <a:rPr lang="en-MY" b="0" i="0" dirty="0">
+                <a:solidFill>
+                  <a:srgbClr val="303030"/>
+                </a:solidFill>
+                <a:effectLst/>
+                <a:latin typeface="Rockwell (Body)"/>
+              </a:rPr>
+              <a:t> consists of:</a:t>
+            </a:r>
+          </a:p>
+          <a:p>
+            <a:pPr lvl="1"/>
+            <a:r>
+              <a:rPr lang="en-MY" i="0" dirty="0">
+                <a:solidFill>
+                  <a:srgbClr val="303030"/>
+                </a:solidFill>
+                <a:effectLst/>
+                <a:latin typeface="Rockwell (Body)"/>
+              </a:rPr>
+              <a:t>Status line with: protocol, status code</a:t>
+            </a:r>
+          </a:p>
+          <a:p>
+            <a:pPr lvl="1"/>
+            <a:r>
+              <a:rPr lang="en-MY" i="0" dirty="0">
+                <a:solidFill>
+                  <a:srgbClr val="303030"/>
+                </a:solidFill>
+                <a:effectLst/>
+                <a:latin typeface="Rockwell (Body)"/>
+              </a:rPr>
+              <a:t> + optional headers (as </a:t>
+            </a:r>
+            <a:r>
+              <a:rPr lang="en-MY" i="0" dirty="0" err="1">
+                <a:solidFill>
+                  <a:srgbClr val="303030"/>
+                </a:solidFill>
+                <a:effectLst/>
+                <a:latin typeface="Rockwell (Body)"/>
+              </a:rPr>
+              <a:t>Name:Value</a:t>
+            </a:r>
+            <a:r>
+              <a:rPr lang="en-MY" i="0" dirty="0">
+                <a:solidFill>
+                  <a:srgbClr val="303030"/>
+                </a:solidFill>
+                <a:effectLst/>
+                <a:latin typeface="Rockwell (Body)"/>
+              </a:rPr>
+              <a:t> pairs)</a:t>
+            </a:r>
+          </a:p>
+          <a:p>
+            <a:pPr lvl="1"/>
+            <a:r>
+              <a:rPr lang="en-MY" i="0" dirty="0">
+                <a:solidFill>
+                  <a:srgbClr val="303030"/>
+                </a:solidFill>
+                <a:effectLst/>
+                <a:latin typeface="Rockwell (Body)"/>
+              </a:rPr>
+              <a:t> + optional body content.</a:t>
+            </a:r>
+          </a:p>
+          <a:p>
+            <a:pPr lvl="1"/>
+            <a:endParaRPr lang="en-MY" b="0" i="0" dirty="0">
+              <a:solidFill>
+                <a:srgbClr val="303030"/>
+              </a:solidFill>
+              <a:effectLst/>
+              <a:latin typeface="Rockwell (Body)"/>
+            </a:endParaRPr>
+          </a:p>
+        </p:txBody>
+      </p:sp>
+      <p:pic>
+        <p:nvPicPr>
+          <p:cNvPr id="7" name="Picture 6" descr="Diagram&#10;&#10;Description automatically generated">
+            <a:extLst>
+              <a:ext uri="{FF2B5EF4-FFF2-40B4-BE49-F238E27FC236}">
+                <a16:creationId xmlns:a16="http://schemas.microsoft.com/office/drawing/2014/main" id="{DD254C58-9393-4AFA-80F9-BC5240462750}"/>
+              </a:ext>
+            </a:extLst>
+          </p:cNvPr>
+          <p:cNvPicPr>
+            <a:picLocks noChangeAspect="1"/>
+          </p:cNvPicPr>
+          <p:nvPr/>
+        </p:nvPicPr>
+        <p:blipFill>
+          <a:blip r:embed="rId2">
+            <a:extLst>
+              <a:ext uri="{28A0092B-C50C-407E-A947-70E740481C1C}">
+                <a14:useLocalDpi xmlns:a14="http://schemas.microsoft.com/office/drawing/2010/main" val="0"/>
+              </a:ext>
+            </a:extLst>
+          </a:blip>
+          <a:stretch>
+            <a:fillRect/>
+          </a:stretch>
+        </p:blipFill>
+        <p:spPr>
+          <a:xfrm>
+            <a:off x="3781425" y="3253237"/>
+            <a:ext cx="7797737" cy="2957379"/>
+          </a:xfrm>
+          <a:prstGeom prst="rect">
+            <a:avLst/>
+          </a:prstGeom>
+        </p:spPr>
+      </p:pic>
     </p:spTree>
     <p:extLst>
       <p:ext uri="{BB962C8B-B14F-4D97-AF65-F5344CB8AC3E}">
@@ -6222,7 +7197,7 @@
 </p:sld>
 </file>
 
-<file path=ppt/slides/slide5.xml><?xml version="1.0" encoding="utf-8"?>
+<file path=ppt/slides/slide7.xml><?xml version="1.0" encoding="utf-8"?>
 <p:sld xmlns:a="http://schemas.openxmlformats.org/drawingml/2006/main" xmlns:r="http://schemas.openxmlformats.org/officeDocument/2006/relationships" xmlns:p="http://schemas.openxmlformats.org/presentationml/2006/main">
   <p:cSld>
     <p:spTree>
@@ -6778,6 +7753,344 @@
           </a:p>
         </p:txBody>
       </p:sp>
+      <p:sp>
+        <p:nvSpPr>
+          <p:cNvPr id="4" name="TextBox 3">
+            <a:extLst>
+              <a:ext uri="{FF2B5EF4-FFF2-40B4-BE49-F238E27FC236}">
+                <a16:creationId xmlns:a16="http://schemas.microsoft.com/office/drawing/2014/main" id="{B3895BAD-CA64-49A7-949A-63ED6B21B369}"/>
+              </a:ext>
+            </a:extLst>
+          </p:cNvPr>
+          <p:cNvSpPr txBox="1"/>
+          <p:nvPr/>
+        </p:nvSpPr>
+        <p:spPr>
+          <a:xfrm>
+            <a:off x="77683" y="2403238"/>
+            <a:ext cx="1123950" cy="369332"/>
+          </a:xfrm>
+          <a:prstGeom prst="rect">
+            <a:avLst/>
+          </a:prstGeom>
+          <a:noFill/>
+        </p:spPr>
+        <p:txBody>
+          <a:bodyPr wrap="square" rtlCol="0">
+            <a:spAutoFit/>
+          </a:bodyPr>
+          <a:lstStyle/>
+          <a:p>
+            <a:r>
+              <a:rPr lang="en-US" b="1" dirty="0">
+                <a:solidFill>
+                  <a:srgbClr val="FF0000"/>
+                </a:solidFill>
+              </a:rPr>
+              <a:t>C</a:t>
+            </a:r>
+            <a:r>
+              <a:rPr lang="en-US" dirty="0"/>
+              <a:t>reate</a:t>
+            </a:r>
+            <a:endParaRPr lang="en-MY" dirty="0"/>
+          </a:p>
+        </p:txBody>
+      </p:sp>
+      <p:sp>
+        <p:nvSpPr>
+          <p:cNvPr id="6" name="TextBox 5">
+            <a:extLst>
+              <a:ext uri="{FF2B5EF4-FFF2-40B4-BE49-F238E27FC236}">
+                <a16:creationId xmlns:a16="http://schemas.microsoft.com/office/drawing/2014/main" id="{EF5F972B-EEB3-4F06-B9D2-444315D78822}"/>
+              </a:ext>
+            </a:extLst>
+          </p:cNvPr>
+          <p:cNvSpPr txBox="1"/>
+          <p:nvPr/>
+        </p:nvSpPr>
+        <p:spPr>
+          <a:xfrm>
+            <a:off x="77683" y="3982391"/>
+            <a:ext cx="1123950" cy="369332"/>
+          </a:xfrm>
+          <a:prstGeom prst="rect">
+            <a:avLst/>
+          </a:prstGeom>
+          <a:noFill/>
+        </p:spPr>
+        <p:txBody>
+          <a:bodyPr wrap="square" rtlCol="0">
+            <a:spAutoFit/>
+          </a:bodyPr>
+          <a:lstStyle/>
+          <a:p>
+            <a:r>
+              <a:rPr lang="en-US" b="1" dirty="0">
+                <a:solidFill>
+                  <a:srgbClr val="FF0000"/>
+                </a:solidFill>
+              </a:rPr>
+              <a:t>D</a:t>
+            </a:r>
+            <a:r>
+              <a:rPr lang="en-US" dirty="0"/>
+              <a:t>elete</a:t>
+            </a:r>
+            <a:endParaRPr lang="en-MY" dirty="0"/>
+          </a:p>
+        </p:txBody>
+      </p:sp>
+      <p:sp>
+        <p:nvSpPr>
+          <p:cNvPr id="7" name="TextBox 6">
+            <a:extLst>
+              <a:ext uri="{FF2B5EF4-FFF2-40B4-BE49-F238E27FC236}">
+                <a16:creationId xmlns:a16="http://schemas.microsoft.com/office/drawing/2014/main" id="{F020CEB7-BBD8-42D5-83E1-7517F5B9A568}"/>
+              </a:ext>
+            </a:extLst>
+          </p:cNvPr>
+          <p:cNvSpPr txBox="1"/>
+          <p:nvPr/>
+        </p:nvSpPr>
+        <p:spPr>
+          <a:xfrm>
+            <a:off x="77683" y="3456414"/>
+            <a:ext cx="1123950" cy="369332"/>
+          </a:xfrm>
+          <a:prstGeom prst="rect">
+            <a:avLst/>
+          </a:prstGeom>
+          <a:noFill/>
+        </p:spPr>
+        <p:txBody>
+          <a:bodyPr wrap="square" rtlCol="0">
+            <a:spAutoFit/>
+          </a:bodyPr>
+          <a:lstStyle/>
+          <a:p>
+            <a:r>
+              <a:rPr lang="en-US" b="1" dirty="0">
+                <a:solidFill>
+                  <a:srgbClr val="FF0000"/>
+                </a:solidFill>
+              </a:rPr>
+              <a:t>U</a:t>
+            </a:r>
+            <a:r>
+              <a:rPr lang="en-US" dirty="0"/>
+              <a:t>pdate</a:t>
+            </a:r>
+            <a:endParaRPr lang="en-MY" dirty="0"/>
+          </a:p>
+        </p:txBody>
+      </p:sp>
+      <p:sp>
+        <p:nvSpPr>
+          <p:cNvPr id="9" name="TextBox 8">
+            <a:extLst>
+              <a:ext uri="{FF2B5EF4-FFF2-40B4-BE49-F238E27FC236}">
+                <a16:creationId xmlns:a16="http://schemas.microsoft.com/office/drawing/2014/main" id="{A272354E-BFCB-4B68-976C-368AB85D5CAC}"/>
+              </a:ext>
+            </a:extLst>
+          </p:cNvPr>
+          <p:cNvSpPr txBox="1"/>
+          <p:nvPr/>
+        </p:nvSpPr>
+        <p:spPr>
+          <a:xfrm>
+            <a:off x="77683" y="2929215"/>
+            <a:ext cx="1000125" cy="369332"/>
+          </a:xfrm>
+          <a:prstGeom prst="rect">
+            <a:avLst/>
+          </a:prstGeom>
+          <a:noFill/>
+        </p:spPr>
+        <p:txBody>
+          <a:bodyPr wrap="square" rtlCol="0">
+            <a:spAutoFit/>
+          </a:bodyPr>
+          <a:lstStyle/>
+          <a:p>
+            <a:r>
+              <a:rPr lang="en-US" b="1" dirty="0">
+                <a:solidFill>
+                  <a:srgbClr val="FF0000"/>
+                </a:solidFill>
+              </a:rPr>
+              <a:t>R</a:t>
+            </a:r>
+            <a:r>
+              <a:rPr lang="en-US" dirty="0"/>
+              <a:t>ead</a:t>
+            </a:r>
+            <a:endParaRPr lang="en-MY" dirty="0"/>
+          </a:p>
+        </p:txBody>
+      </p:sp>
+      <p:cxnSp>
+        <p:nvCxnSpPr>
+          <p:cNvPr id="10" name="Straight Arrow Connector 9">
+            <a:extLst>
+              <a:ext uri="{FF2B5EF4-FFF2-40B4-BE49-F238E27FC236}">
+                <a16:creationId xmlns:a16="http://schemas.microsoft.com/office/drawing/2014/main" id="{D586C27A-D9D5-4B1D-8788-A1C78DA2C638}"/>
+              </a:ext>
+            </a:extLst>
+          </p:cNvPr>
+          <p:cNvCxnSpPr/>
+          <p:nvPr/>
+        </p:nvCxnSpPr>
+        <p:spPr>
+          <a:xfrm>
+            <a:off x="876300" y="2609850"/>
+            <a:ext cx="571500" cy="319365"/>
+          </a:xfrm>
+          <a:prstGeom prst="straightConnector1">
+            <a:avLst/>
+          </a:prstGeom>
+          <a:ln>
+            <a:tailEnd type="triangle"/>
+          </a:ln>
+        </p:spPr>
+        <p:style>
+          <a:lnRef idx="1">
+            <a:schemeClr val="accent1"/>
+          </a:lnRef>
+          <a:fillRef idx="0">
+            <a:schemeClr val="accent1"/>
+          </a:fillRef>
+          <a:effectRef idx="0">
+            <a:schemeClr val="accent1"/>
+          </a:effectRef>
+          <a:fontRef idx="minor">
+            <a:schemeClr val="tx1"/>
+          </a:fontRef>
+        </p:style>
+      </p:cxnSp>
+      <p:cxnSp>
+        <p:nvCxnSpPr>
+          <p:cNvPr id="11" name="Straight Arrow Connector 10">
+            <a:extLst>
+              <a:ext uri="{FF2B5EF4-FFF2-40B4-BE49-F238E27FC236}">
+                <a16:creationId xmlns:a16="http://schemas.microsoft.com/office/drawing/2014/main" id="{3B62EA24-8541-4E26-85E4-7C269C660B7A}"/>
+              </a:ext>
+            </a:extLst>
+          </p:cNvPr>
+          <p:cNvCxnSpPr>
+            <a:cxnSpLocks/>
+          </p:cNvCxnSpPr>
+          <p:nvPr/>
+        </p:nvCxnSpPr>
+        <p:spPr>
+          <a:xfrm flipV="1">
+            <a:off x="800018" y="2609850"/>
+            <a:ext cx="647782" cy="541421"/>
+          </a:xfrm>
+          <a:prstGeom prst="straightConnector1">
+            <a:avLst/>
+          </a:prstGeom>
+          <a:ln>
+            <a:tailEnd type="triangle"/>
+          </a:ln>
+        </p:spPr>
+        <p:style>
+          <a:lnRef idx="1">
+            <a:schemeClr val="accent1"/>
+          </a:lnRef>
+          <a:fillRef idx="0">
+            <a:schemeClr val="accent1"/>
+          </a:fillRef>
+          <a:effectRef idx="0">
+            <a:schemeClr val="accent1"/>
+          </a:effectRef>
+          <a:fontRef idx="minor">
+            <a:schemeClr val="tx1"/>
+          </a:fontRef>
+        </p:style>
+      </p:cxnSp>
+      <p:cxnSp>
+        <p:nvCxnSpPr>
+          <p:cNvPr id="13" name="Straight Arrow Connector 12">
+            <a:extLst>
+              <a:ext uri="{FF2B5EF4-FFF2-40B4-BE49-F238E27FC236}">
+                <a16:creationId xmlns:a16="http://schemas.microsoft.com/office/drawing/2014/main" id="{A82AE415-D90B-41F1-B248-B072EB5B2118}"/>
+              </a:ext>
+            </a:extLst>
+          </p:cNvPr>
+          <p:cNvCxnSpPr>
+            <a:cxnSpLocks/>
+          </p:cNvCxnSpPr>
+          <p:nvPr/>
+        </p:nvCxnSpPr>
+        <p:spPr>
+          <a:xfrm flipV="1">
+            <a:off x="938913" y="3451622"/>
+            <a:ext cx="508887" cy="215523"/>
+          </a:xfrm>
+          <a:prstGeom prst="straightConnector1">
+            <a:avLst/>
+          </a:prstGeom>
+          <a:ln>
+            <a:tailEnd type="triangle"/>
+          </a:ln>
+        </p:spPr>
+        <p:style>
+          <a:lnRef idx="1">
+            <a:schemeClr val="accent1"/>
+          </a:lnRef>
+          <a:fillRef idx="0">
+            <a:schemeClr val="accent1"/>
+          </a:fillRef>
+          <a:effectRef idx="0">
+            <a:schemeClr val="accent1"/>
+          </a:effectRef>
+          <a:fontRef idx="minor">
+            <a:schemeClr val="tx1"/>
+          </a:fontRef>
+        </p:style>
+      </p:cxnSp>
+      <p:cxnSp>
+        <p:nvCxnSpPr>
+          <p:cNvPr id="16" name="Straight Arrow Connector 15">
+            <a:extLst>
+              <a:ext uri="{FF2B5EF4-FFF2-40B4-BE49-F238E27FC236}">
+                <a16:creationId xmlns:a16="http://schemas.microsoft.com/office/drawing/2014/main" id="{E4D072DE-159E-4BA7-9627-7338C483E92B}"/>
+              </a:ext>
+            </a:extLst>
+          </p:cNvPr>
+          <p:cNvCxnSpPr>
+            <a:cxnSpLocks/>
+          </p:cNvCxnSpPr>
+          <p:nvPr/>
+        </p:nvCxnSpPr>
+        <p:spPr>
+          <a:xfrm flipV="1">
+            <a:off x="876300" y="3830538"/>
+            <a:ext cx="512785" cy="384529"/>
+          </a:xfrm>
+          <a:prstGeom prst="straightConnector1">
+            <a:avLst/>
+          </a:prstGeom>
+          <a:ln>
+            <a:tailEnd type="triangle"/>
+          </a:ln>
+        </p:spPr>
+        <p:style>
+          <a:lnRef idx="1">
+            <a:schemeClr val="accent1"/>
+          </a:lnRef>
+          <a:fillRef idx="0">
+            <a:schemeClr val="accent1"/>
+          </a:fillRef>
+          <a:effectRef idx="0">
+            <a:schemeClr val="accent1"/>
+          </a:effectRef>
+          <a:fontRef idx="minor">
+            <a:schemeClr val="tx1"/>
+          </a:fontRef>
+        </p:style>
+      </p:cxnSp>
     </p:spTree>
     <p:extLst>
       <p:ext uri="{BB962C8B-B14F-4D97-AF65-F5344CB8AC3E}">
@@ -6791,7 +8104,7 @@
 </p:sld>
 </file>
 
-<file path=ppt/slides/slide6.xml><?xml version="1.0" encoding="utf-8"?>
+<file path=ppt/slides/slide8.xml><?xml version="1.0" encoding="utf-8"?>
 <p:sld xmlns:a="http://schemas.openxmlformats.org/drawingml/2006/main" xmlns:r="http://schemas.openxmlformats.org/officeDocument/2006/relationships" xmlns:p="http://schemas.openxmlformats.org/presentationml/2006/main">
   <p:cSld>
     <p:spTree>
@@ -7156,8 +8469,8 @@
         </p:nvSpPr>
         <p:spPr>
           <a:xfrm>
-            <a:off x="5095782" y="5362113"/>
-            <a:ext cx="5628442" cy="923330"/>
+            <a:off x="5095781" y="5362113"/>
+            <a:ext cx="6715219" cy="1200329"/>
           </a:xfrm>
           <a:prstGeom prst="rect">
             <a:avLst/>
@@ -7179,6 +8492,30 @@
                 </a:solidFill>
               </a:rPr>
               <a:t>Webapp need dynamically generate html contents based on session history, user inputs, database stored information.</a:t>
+            </a:r>
+          </a:p>
+          <a:p>
+            <a:r>
+              <a:rPr lang="en-US" dirty="0">
+                <a:solidFill>
+                  <a:schemeClr val="accent1">
+                    <a:lumMod val="75000"/>
+                  </a:schemeClr>
+                </a:solidFill>
+              </a:rPr>
+              <a:t>Html will define the structure of those data.</a:t>
+            </a:r>
+          </a:p>
+          <a:p>
+            <a:r>
+              <a:rPr lang="en-US" dirty="0">
+                <a:solidFill>
+                  <a:schemeClr val="accent1">
+                    <a:lumMod val="75000"/>
+                  </a:schemeClr>
+                </a:solidFill>
+              </a:rPr>
+              <a:t>CSS will define the style, how the information presented.</a:t>
             </a:r>
             <a:endParaRPr lang="en-MY" dirty="0">
               <a:solidFill>
@@ -7203,7 +8540,7 @@
 </p:sld>
 </file>
 
-<file path=ppt/slides/slide7.xml><?xml version="1.0" encoding="utf-8"?>
+<file path=ppt/slides/slide9.xml><?xml version="1.0" encoding="utf-8"?>
 <p:sld xmlns:a="http://schemas.openxmlformats.org/drawingml/2006/main" xmlns:r="http://schemas.openxmlformats.org/officeDocument/2006/relationships" xmlns:p="http://schemas.openxmlformats.org/presentationml/2006/main">
   <p:cSld>
     <p:spTree>
@@ -7413,379 +8750,6 @@
     <p:extLst>
       <p:ext uri="{BB962C8B-B14F-4D97-AF65-F5344CB8AC3E}">
         <p14:creationId xmlns:p14="http://schemas.microsoft.com/office/powerpoint/2010/main" val="1916825410"/>
-      </p:ext>
-    </p:extLst>
-  </p:cSld>
-  <p:clrMapOvr>
-    <a:masterClrMapping/>
-  </p:clrMapOvr>
-</p:sld>
-</file>
-
-<file path=ppt/slides/slide8.xml><?xml version="1.0" encoding="utf-8"?>
-<p:sld xmlns:a="http://schemas.openxmlformats.org/drawingml/2006/main" xmlns:r="http://schemas.openxmlformats.org/officeDocument/2006/relationships" xmlns:p="http://schemas.openxmlformats.org/presentationml/2006/main">
-  <p:cSld>
-    <p:spTree>
-      <p:nvGrpSpPr>
-        <p:cNvPr id="1" name=""/>
-        <p:cNvGrpSpPr/>
-        <p:nvPr/>
-      </p:nvGrpSpPr>
-      <p:grpSpPr>
-        <a:xfrm>
-          <a:off x="0" y="0"/>
-          <a:ext cx="0" cy="0"/>
-          <a:chOff x="0" y="0"/>
-          <a:chExt cx="0" cy="0"/>
-        </a:xfrm>
-      </p:grpSpPr>
-      <p:sp>
-        <p:nvSpPr>
-          <p:cNvPr id="2" name="Title 1">
-            <a:extLst>
-              <a:ext uri="{FF2B5EF4-FFF2-40B4-BE49-F238E27FC236}">
-                <a16:creationId xmlns:a16="http://schemas.microsoft.com/office/drawing/2014/main" id="{5A817F65-0249-4813-916F-D22CF5F41D8C}"/>
-              </a:ext>
-            </a:extLst>
-          </p:cNvPr>
-          <p:cNvSpPr>
-            <a:spLocks noGrp="1"/>
-          </p:cNvSpPr>
-          <p:nvPr>
-            <p:ph type="title"/>
-          </p:nvPr>
-        </p:nvSpPr>
-        <p:spPr/>
-        <p:txBody>
-          <a:bodyPr/>
-          <a:lstStyle/>
-          <a:p>
-            <a:r>
-              <a:rPr lang="en-US" dirty="0"/>
-              <a:t>Html basics</a:t>
-            </a:r>
-            <a:endParaRPr lang="en-MY" dirty="0"/>
-          </a:p>
-        </p:txBody>
-      </p:sp>
-      <p:sp>
-        <p:nvSpPr>
-          <p:cNvPr id="3" name="Content Placeholder 2">
-            <a:extLst>
-              <a:ext uri="{FF2B5EF4-FFF2-40B4-BE49-F238E27FC236}">
-                <a16:creationId xmlns:a16="http://schemas.microsoft.com/office/drawing/2014/main" id="{588B000C-CCD7-42E0-A4A2-DB893ED55A0D}"/>
-              </a:ext>
-            </a:extLst>
-          </p:cNvPr>
-          <p:cNvSpPr>
-            <a:spLocks noGrp="1"/>
-          </p:cNvSpPr>
-          <p:nvPr>
-            <p:ph idx="1"/>
-          </p:nvPr>
-        </p:nvSpPr>
-        <p:spPr/>
-        <p:txBody>
-          <a:bodyPr>
-            <a:normAutofit fontScale="92500" lnSpcReduction="10000"/>
-          </a:bodyPr>
-          <a:lstStyle/>
-          <a:p>
-            <a:r>
-              <a:rPr lang="en-US" dirty="0"/>
-              <a:t>Class and id</a:t>
-            </a:r>
-          </a:p>
-          <a:p>
-            <a:pPr lvl="1"/>
-            <a:r>
-              <a:rPr lang="en-US" dirty="0"/>
-              <a:t>A tag can have class attributes. One tag can have many classes. Also many tag can have same class</a:t>
-            </a:r>
-          </a:p>
-          <a:p>
-            <a:pPr lvl="1"/>
-            <a:r>
-              <a:rPr lang="en-US" dirty="0"/>
-              <a:t>A tag can have id attribute. The id must be unique inside the whole file.</a:t>
-            </a:r>
-          </a:p>
-          <a:p>
-            <a:r>
-              <a:rPr lang="en-US" dirty="0"/>
-              <a:t>Styling to class and id</a:t>
-            </a:r>
-          </a:p>
-          <a:p>
-            <a:pPr lvl="1"/>
-            <a:r>
-              <a:rPr lang="en-US" dirty="0"/>
-              <a:t>The styling is not restricted to tags. Better practice is to give style to class, or id</a:t>
-            </a:r>
-          </a:p>
-          <a:p>
-            <a:pPr lvl="1"/>
-            <a:r>
-              <a:rPr lang="en-US" dirty="0"/>
-              <a:t>Then in html body, you give class to different tag.</a:t>
-            </a:r>
-          </a:p>
-          <a:p>
-            <a:r>
-              <a:rPr lang="en-US" dirty="0"/>
-              <a:t>Grouping of many</a:t>
-            </a:r>
-          </a:p>
-          <a:p>
-            <a:pPr lvl="1"/>
-            <a:r>
-              <a:rPr lang="en-US" dirty="0"/>
-              <a:t>&lt;div&gt;&lt;/div&gt; is used to group many tag (sections, text paragraphs), and assign a class to it can style for all of them</a:t>
-            </a:r>
-          </a:p>
-          <a:p>
-            <a:r>
-              <a:rPr lang="en-US" dirty="0"/>
-              <a:t>Picking part</a:t>
-            </a:r>
-          </a:p>
-          <a:p>
-            <a:pPr lvl="1"/>
-            <a:r>
-              <a:rPr lang="en-US" dirty="0"/>
-              <a:t>&lt;span&gt;&lt;/span&gt; is used to picking up some of the text inline, and assign a class to it can style for only this part of text</a:t>
-            </a:r>
-          </a:p>
-        </p:txBody>
-      </p:sp>
-    </p:spTree>
-    <p:extLst>
-      <p:ext uri="{BB962C8B-B14F-4D97-AF65-F5344CB8AC3E}">
-        <p14:creationId xmlns:p14="http://schemas.microsoft.com/office/powerpoint/2010/main" val="3858986464"/>
-      </p:ext>
-    </p:extLst>
-  </p:cSld>
-  <p:clrMapOvr>
-    <a:masterClrMapping/>
-  </p:clrMapOvr>
-</p:sld>
-</file>
-
-<file path=ppt/slides/slide9.xml><?xml version="1.0" encoding="utf-8"?>
-<p:sld xmlns:a="http://schemas.openxmlformats.org/drawingml/2006/main" xmlns:r="http://schemas.openxmlformats.org/officeDocument/2006/relationships" xmlns:p="http://schemas.openxmlformats.org/presentationml/2006/main">
-  <p:cSld>
-    <p:spTree>
-      <p:nvGrpSpPr>
-        <p:cNvPr id="1" name=""/>
-        <p:cNvGrpSpPr/>
-        <p:nvPr/>
-      </p:nvGrpSpPr>
-      <p:grpSpPr>
-        <a:xfrm>
-          <a:off x="0" y="0"/>
-          <a:ext cx="0" cy="0"/>
-          <a:chOff x="0" y="0"/>
-          <a:chExt cx="0" cy="0"/>
-        </a:xfrm>
-      </p:grpSpPr>
-      <p:sp>
-        <p:nvSpPr>
-          <p:cNvPr id="2" name="Title 1">
-            <a:extLst>
-              <a:ext uri="{FF2B5EF4-FFF2-40B4-BE49-F238E27FC236}">
-                <a16:creationId xmlns:a16="http://schemas.microsoft.com/office/drawing/2014/main" id="{5A817F65-0249-4813-916F-D22CF5F41D8C}"/>
-              </a:ext>
-            </a:extLst>
-          </p:cNvPr>
-          <p:cNvSpPr>
-            <a:spLocks noGrp="1"/>
-          </p:cNvSpPr>
-          <p:nvPr>
-            <p:ph type="title"/>
-          </p:nvPr>
-        </p:nvSpPr>
-        <p:spPr/>
-        <p:txBody>
-          <a:bodyPr/>
-          <a:lstStyle/>
-          <a:p>
-            <a:r>
-              <a:rPr lang="en-US" dirty="0"/>
-              <a:t>Other html tags</a:t>
-            </a:r>
-            <a:endParaRPr lang="en-MY" dirty="0"/>
-          </a:p>
-        </p:txBody>
-      </p:sp>
-      <p:sp>
-        <p:nvSpPr>
-          <p:cNvPr id="3" name="Content Placeholder 2">
-            <a:extLst>
-              <a:ext uri="{FF2B5EF4-FFF2-40B4-BE49-F238E27FC236}">
-                <a16:creationId xmlns:a16="http://schemas.microsoft.com/office/drawing/2014/main" id="{588B000C-CCD7-42E0-A4A2-DB893ED55A0D}"/>
-              </a:ext>
-            </a:extLst>
-          </p:cNvPr>
-          <p:cNvSpPr>
-            <a:spLocks noGrp="1"/>
-          </p:cNvSpPr>
-          <p:nvPr>
-            <p:ph idx="1"/>
-          </p:nvPr>
-        </p:nvSpPr>
-        <p:spPr>
-          <a:xfrm>
-            <a:off x="1069848" y="1917577"/>
-            <a:ext cx="10058400" cy="4527611"/>
-          </a:xfrm>
-        </p:spPr>
-        <p:txBody>
-          <a:bodyPr>
-            <a:normAutofit/>
-          </a:bodyPr>
-          <a:lstStyle/>
-          <a:p>
-            <a:r>
-              <a:rPr lang="en-US" dirty="0"/>
-              <a:t>Bullet-points</a:t>
-            </a:r>
-          </a:p>
-          <a:p>
-            <a:pPr lvl="1"/>
-            <a:r>
-              <a:rPr lang="en-US" dirty="0"/>
-              <a:t>&lt;ul&gt; &lt;/ul&gt;for unordered list. &lt;li&gt; for list item</a:t>
-            </a:r>
-          </a:p>
-          <a:p>
-            <a:pPr lvl="1"/>
-            <a:r>
-              <a:rPr lang="en-US" dirty="0"/>
-              <a:t>&lt;</a:t>
-            </a:r>
-            <a:r>
-              <a:rPr lang="en-US" dirty="0" err="1"/>
-              <a:t>ol</a:t>
-            </a:r>
-            <a:r>
-              <a:rPr lang="en-US" dirty="0"/>
-              <a:t>&gt; &lt;/</a:t>
-            </a:r>
-            <a:r>
-              <a:rPr lang="en-US" dirty="0" err="1"/>
-              <a:t>ol</a:t>
-            </a:r>
-            <a:r>
-              <a:rPr lang="en-US" dirty="0"/>
-              <a:t>&gt;for ordered list. &lt;li&gt; for list item</a:t>
-            </a:r>
-          </a:p>
-          <a:p>
-            <a:r>
-              <a:rPr lang="en-US" dirty="0"/>
-              <a:t>Table</a:t>
-            </a:r>
-          </a:p>
-          <a:p>
-            <a:pPr lvl="1"/>
-            <a:r>
-              <a:rPr lang="en-US" dirty="0"/>
-              <a:t>&lt;table&gt;&lt;/table&gt;</a:t>
-            </a:r>
-          </a:p>
-          <a:p>
-            <a:pPr lvl="1"/>
-            <a:r>
-              <a:rPr lang="en-US" dirty="0"/>
-              <a:t>&lt;tr&gt; &lt;/tr&gt;, for table row</a:t>
-            </a:r>
-          </a:p>
-          <a:p>
-            <a:pPr lvl="1"/>
-            <a:r>
-              <a:rPr lang="en-US" dirty="0"/>
-              <a:t>&lt;td&gt; &lt;/td&gt;, for table cell</a:t>
-            </a:r>
-          </a:p>
-          <a:p>
-            <a:pPr lvl="1"/>
-            <a:r>
-              <a:rPr lang="en-US" dirty="0"/>
-              <a:t>&lt;</a:t>
-            </a:r>
-            <a:r>
-              <a:rPr lang="en-US" dirty="0" err="1"/>
-              <a:t>th</a:t>
-            </a:r>
-            <a:r>
-              <a:rPr lang="en-US" dirty="0"/>
-              <a:t>&gt; &lt;/</a:t>
-            </a:r>
-            <a:r>
-              <a:rPr lang="en-US" dirty="0" err="1"/>
-              <a:t>th</a:t>
-            </a:r>
-            <a:r>
-              <a:rPr lang="en-US" dirty="0"/>
-              <a:t>&gt;, make one cell as table header</a:t>
-            </a:r>
-          </a:p>
-          <a:p>
-            <a:r>
-              <a:rPr lang="en-US" dirty="0"/>
-              <a:t>Image</a:t>
-            </a:r>
-          </a:p>
-          <a:p>
-            <a:pPr lvl="1"/>
-            <a:r>
-              <a:rPr lang="en-US" dirty="0"/>
-              <a:t>&lt;</a:t>
-            </a:r>
-            <a:r>
-              <a:rPr lang="en-US" dirty="0" err="1"/>
-              <a:t>img</a:t>
-            </a:r>
-            <a:r>
-              <a:rPr lang="en-US" dirty="0"/>
-              <a:t>&gt; with </a:t>
-            </a:r>
-            <a:r>
-              <a:rPr lang="en-US" dirty="0" err="1"/>
-              <a:t>src</a:t>
-            </a:r>
-            <a:r>
-              <a:rPr lang="en-US" dirty="0"/>
-              <a:t> attributes to specify loading image file</a:t>
-            </a:r>
-          </a:p>
-          <a:p>
-            <a:r>
-              <a:rPr lang="en-US" dirty="0"/>
-              <a:t>Hyperlinks</a:t>
-            </a:r>
-          </a:p>
-          <a:p>
-            <a:pPr lvl="1"/>
-            <a:r>
-              <a:rPr lang="en-US" dirty="0"/>
-              <a:t>&lt;a&gt; &lt;/a&gt; with </a:t>
-            </a:r>
-            <a:r>
-              <a:rPr lang="en-US" dirty="0" err="1"/>
-              <a:t>href</a:t>
-            </a:r>
-            <a:r>
-              <a:rPr lang="en-US" dirty="0"/>
-              <a:t> attributes to specify a linking URL</a:t>
-            </a:r>
-          </a:p>
-        </p:txBody>
-      </p:sp>
-    </p:spTree>
-    <p:extLst>
-      <p:ext uri="{BB962C8B-B14F-4D97-AF65-F5344CB8AC3E}">
-        <p14:creationId xmlns:p14="http://schemas.microsoft.com/office/powerpoint/2010/main" val="1584354543"/>
       </p:ext>
     </p:extLst>
   </p:cSld>

</xml_diff>